<commit_message>
final commit in preperation for June .NetDug
</commit_message>
<xml_diff>
--- a/2012_CodeCamp_PowerShell.pptx
+++ b/2012_CodeCamp_PowerShell.pptx
@@ -22,7 +22,7 @@
     <p:sldId id="267" r:id="rId13"/>
     <p:sldId id="268" r:id="rId14"/>
     <p:sldId id="269" r:id="rId15"/>
-    <p:sldId id="270" r:id="rId16"/>
+    <p:sldId id="271" r:id="rId16"/>
   </p:sldIdLst>
   <p:sldSz cx="9144000" cy="6858000" type="screen4x3"/>
   <p:notesSz cx="6858000" cy="9144000"/>
@@ -206,7 +206,7 @@
           <a:p>
             <a:fld id="{6FF582EB-F544-477B-90B4-670621DC59BE}" type="datetimeFigureOut">
               <a:rPr lang="en-US" smtClean="0"/>
-              <a:t>3/19/2012</a:t>
+              <a:t>3/26/2012</a:t>
             </a:fld>
             <a:endParaRPr lang="en-US"/>
           </a:p>
@@ -751,7 +751,7 @@
           <a:p>
             <a:fld id="{F4138DC9-8137-4E39-9059-FED75AFDE476}" type="datetime1">
               <a:rPr lang="en-US" smtClean="0"/>
-              <a:t>3/19/2012</a:t>
+              <a:t>3/26/2012</a:t>
             </a:fld>
             <a:endParaRPr lang="en-US"/>
           </a:p>
@@ -948,7 +948,7 @@
           <a:p>
             <a:fld id="{D694C78B-7B48-4C92-B984-38065B2F3287}" type="datetime1">
               <a:rPr lang="en-US" smtClean="0"/>
-              <a:t>3/19/2012</a:t>
+              <a:t>3/26/2012</a:t>
             </a:fld>
             <a:endParaRPr lang="en-US"/>
           </a:p>
@@ -1148,7 +1148,7 @@
           <a:p>
             <a:fld id="{BA1D101A-1A2D-4742-97B8-2B317B7A4AD8}" type="datetime1">
               <a:rPr lang="en-US" smtClean="0"/>
-              <a:t>3/19/2012</a:t>
+              <a:t>3/26/2012</a:t>
             </a:fld>
             <a:endParaRPr lang="en-US"/>
           </a:p>
@@ -1346,7 +1346,7 @@
           <a:p>
             <a:fld id="{0C84CA67-0A36-492E-9A5D-2A3562651BF8}" type="datetime1">
               <a:rPr lang="en-US" smtClean="0"/>
-              <a:t>3/19/2012</a:t>
+              <a:t>3/26/2012</a:t>
             </a:fld>
             <a:endParaRPr lang="en-US"/>
           </a:p>
@@ -1619,7 +1619,7 @@
           <a:p>
             <a:fld id="{14B6663C-9179-41C7-A747-F954790BC68F}" type="datetime1">
               <a:rPr lang="en-US" smtClean="0"/>
-              <a:t>3/19/2012</a:t>
+              <a:t>3/26/2012</a:t>
             </a:fld>
             <a:endParaRPr lang="en-US"/>
           </a:p>
@@ -1934,7 +1934,7 @@
           <a:p>
             <a:fld id="{0D8AA9D9-7250-4C45-9A51-088978D05897}" type="datetime1">
               <a:rPr lang="en-US" smtClean="0"/>
-              <a:t>3/19/2012</a:t>
+              <a:t>3/26/2012</a:t>
             </a:fld>
             <a:endParaRPr lang="en-US"/>
           </a:p>
@@ -2376,7 +2376,7 @@
           <a:p>
             <a:fld id="{6FC81251-6A76-446F-AA9D-6415AB23E9BB}" type="datetime1">
               <a:rPr lang="en-US" smtClean="0"/>
-              <a:t>3/19/2012</a:t>
+              <a:t>3/26/2012</a:t>
             </a:fld>
             <a:endParaRPr lang="en-US"/>
           </a:p>
@@ -2514,7 +2514,7 @@
           <a:p>
             <a:fld id="{DB0F28F0-7B43-49F7-B8EE-3BD787FA1481}" type="datetime1">
               <a:rPr lang="en-US" smtClean="0"/>
-              <a:t>3/19/2012</a:t>
+              <a:t>3/26/2012</a:t>
             </a:fld>
             <a:endParaRPr lang="en-US"/>
           </a:p>
@@ -2629,7 +2629,7 @@
           <a:p>
             <a:fld id="{B1894B58-B4EE-4796-A63C-092293ACE578}" type="datetime1">
               <a:rPr lang="en-US" smtClean="0"/>
-              <a:t>3/19/2012</a:t>
+              <a:t>3/26/2012</a:t>
             </a:fld>
             <a:endParaRPr lang="en-US"/>
           </a:p>
@@ -2926,7 +2926,7 @@
           <a:p>
             <a:fld id="{534AD731-DD6D-4412-9388-7370017D30E2}" type="datetime1">
               <a:rPr lang="en-US" smtClean="0"/>
-              <a:t>3/19/2012</a:t>
+              <a:t>3/26/2012</a:t>
             </a:fld>
             <a:endParaRPr lang="en-US"/>
           </a:p>
@@ -3199,7 +3199,7 @@
           <a:p>
             <a:fld id="{BF638580-D63B-47ED-AC64-AFC3F6F731DA}" type="datetime1">
               <a:rPr lang="en-US" smtClean="0"/>
-              <a:t>3/19/2012</a:t>
+              <a:t>3/26/2012</a:t>
             </a:fld>
             <a:endParaRPr lang="en-US"/>
           </a:p>
@@ -4397,98 +4397,6 @@
       </p:sp>
       <p:sp>
         <p:nvSpPr>
-          <p:cNvPr id="6" name="TextBox 5"/>
-          <p:cNvSpPr txBox="1"/>
-          <p:nvPr/>
-        </p:nvSpPr>
-        <p:spPr>
-          <a:xfrm>
-            <a:off x="597117" y="1661403"/>
-            <a:ext cx="7661731" cy="1938992"/>
-          </a:xfrm>
-          <a:prstGeom prst="rect">
-            <a:avLst/>
-          </a:prstGeom>
-          <a:noFill/>
-        </p:spPr>
-        <p:txBody>
-          <a:bodyPr wrap="square" rtlCol="0">
-            <a:spAutoFit/>
-          </a:bodyPr>
-          <a:lstStyle/>
-          <a:p>
-            <a:pPr marL="571500" indent="-571500">
-              <a:buFont typeface="Arial" pitchFamily="34" charset="0"/>
-              <a:buChar char="•"/>
-            </a:pPr>
-            <a:r>
-              <a:rPr lang="en-US" sz="3000" dirty="0" smtClean="0">
-                <a:solidFill>
-                  <a:schemeClr val="tx2">
-                    <a:lumMod val="20000"/>
-                    <a:lumOff val="80000"/>
-                  </a:schemeClr>
-                </a:solidFill>
-                <a:latin typeface="Soho Std" pitchFamily="18" charset="0"/>
-              </a:rPr>
-              <a:t>Not automated</a:t>
-            </a:r>
-          </a:p>
-          <a:p>
-            <a:pPr marL="571500" indent="-571500">
-              <a:buFont typeface="Arial" pitchFamily="34" charset="0"/>
-              <a:buChar char="•"/>
-            </a:pPr>
-            <a:r>
-              <a:rPr lang="en-US" sz="3000" dirty="0" smtClean="0">
-                <a:solidFill>
-                  <a:schemeClr val="tx2">
-                    <a:lumMod val="20000"/>
-                    <a:lumOff val="80000"/>
-                  </a:schemeClr>
-                </a:solidFill>
-                <a:latin typeface="Soho Std" pitchFamily="18" charset="0"/>
-              </a:rPr>
-              <a:t>Everything is public</a:t>
-            </a:r>
-          </a:p>
-          <a:p>
-            <a:pPr marL="571500" indent="-571500">
-              <a:buFont typeface="Arial" pitchFamily="34" charset="0"/>
-              <a:buChar char="•"/>
-            </a:pPr>
-            <a:r>
-              <a:rPr lang="en-US" sz="3000" dirty="0" smtClean="0">
-                <a:solidFill>
-                  <a:schemeClr val="tx2">
-                    <a:lumMod val="20000"/>
-                    <a:lumOff val="80000"/>
-                  </a:schemeClr>
-                </a:solidFill>
-                <a:latin typeface="Soho Std" pitchFamily="18" charset="0"/>
-              </a:rPr>
-              <a:t>!Fun with lots of files</a:t>
-            </a:r>
-          </a:p>
-          <a:p>
-            <a:pPr marL="571500" indent="-571500">
-              <a:buFont typeface="Arial" pitchFamily="34" charset="0"/>
-              <a:buChar char="•"/>
-            </a:pPr>
-            <a:endParaRPr lang="en-US" sz="3000" dirty="0">
-              <a:solidFill>
-                <a:schemeClr val="tx2">
-                  <a:lumMod val="20000"/>
-                  <a:lumOff val="80000"/>
-                </a:schemeClr>
-              </a:solidFill>
-              <a:latin typeface="Soho Std" pitchFamily="18" charset="0"/>
-            </a:endParaRPr>
-          </a:p>
-        </p:txBody>
-      </p:sp>
-      <p:sp>
-        <p:nvSpPr>
           <p:cNvPr id="3" name="Footer Placeholder 2"/>
           <p:cNvSpPr>
             <a:spLocks noGrp="1"/>
@@ -4619,189 +4527,6 @@
                       </p:childTnLst>
                     </p:cTn>
                   </p:par>
-                  <p:par>
-                    <p:cTn id="11" fill="hold">
-                      <p:stCondLst>
-                        <p:cond delay="indefinite"/>
-                      </p:stCondLst>
-                      <p:childTnLst>
-                        <p:par>
-                          <p:cTn id="12" fill="hold">
-                            <p:stCondLst>
-                              <p:cond delay="0"/>
-                            </p:stCondLst>
-                            <p:childTnLst>
-                              <p:par>
-                                <p:cTn id="13" presetID="10" presetClass="entr" presetSubtype="0" fill="hold" nodeType="clickEffect">
-                                  <p:stCondLst>
-                                    <p:cond delay="0"/>
-                                  </p:stCondLst>
-                                  <p:childTnLst>
-                                    <p:set>
-                                      <p:cBhvr>
-                                        <p:cTn id="14" dur="1" fill="hold">
-                                          <p:stCondLst>
-                                            <p:cond delay="0"/>
-                                          </p:stCondLst>
-                                        </p:cTn>
-                                        <p:tgtEl>
-                                          <p:spTgt spid="6">
-                                            <p:txEl>
-                                              <p:pRg st="0" end="0"/>
-                                            </p:txEl>
-                                          </p:spTgt>
-                                        </p:tgtEl>
-                                        <p:attrNameLst>
-                                          <p:attrName>style.visibility</p:attrName>
-                                        </p:attrNameLst>
-                                      </p:cBhvr>
-                                      <p:to>
-                                        <p:strVal val="visible"/>
-                                      </p:to>
-                                    </p:set>
-                                    <p:animEffect transition="in" filter="fade">
-                                      <p:cBhvr>
-                                        <p:cTn id="15" dur="500"/>
-                                        <p:tgtEl>
-                                          <p:spTgt spid="6">
-                                            <p:txEl>
-                                              <p:pRg st="0" end="0"/>
-                                            </p:txEl>
-                                          </p:spTgt>
-                                        </p:tgtEl>
-                                      </p:cBhvr>
-                                    </p:animEffect>
-                                  </p:childTnLst>
-                                </p:cTn>
-                              </p:par>
-                            </p:childTnLst>
-                          </p:cTn>
-                        </p:par>
-                      </p:childTnLst>
-                    </p:cTn>
-                  </p:par>
-                  <p:par>
-                    <p:cTn id="16" fill="hold">
-                      <p:stCondLst>
-                        <p:cond delay="indefinite"/>
-                      </p:stCondLst>
-                      <p:childTnLst>
-                        <p:par>
-                          <p:cTn id="17" fill="hold">
-                            <p:stCondLst>
-                              <p:cond delay="0"/>
-                            </p:stCondLst>
-                            <p:childTnLst>
-                              <p:par>
-                                <p:cTn id="18" presetID="10" presetClass="entr" presetSubtype="0" fill="hold" nodeType="clickEffect">
-                                  <p:stCondLst>
-                                    <p:cond delay="0"/>
-                                  </p:stCondLst>
-                                  <p:childTnLst>
-                                    <p:set>
-                                      <p:cBhvr>
-                                        <p:cTn id="19" dur="1" fill="hold">
-                                          <p:stCondLst>
-                                            <p:cond delay="0"/>
-                                          </p:stCondLst>
-                                        </p:cTn>
-                                        <p:tgtEl>
-                                          <p:spTgt spid="6">
-                                            <p:txEl>
-                                              <p:pRg st="1" end="1"/>
-                                            </p:txEl>
-                                          </p:spTgt>
-                                        </p:tgtEl>
-                                        <p:attrNameLst>
-                                          <p:attrName>style.visibility</p:attrName>
-                                        </p:attrNameLst>
-                                      </p:cBhvr>
-                                      <p:to>
-                                        <p:strVal val="visible"/>
-                                      </p:to>
-                                    </p:set>
-                                    <p:animEffect transition="in" filter="fade">
-                                      <p:cBhvr>
-                                        <p:cTn id="20" dur="500"/>
-                                        <p:tgtEl>
-                                          <p:spTgt spid="6">
-                                            <p:txEl>
-                                              <p:pRg st="1" end="1"/>
-                                            </p:txEl>
-                                          </p:spTgt>
-                                        </p:tgtEl>
-                                      </p:cBhvr>
-                                    </p:animEffect>
-                                  </p:childTnLst>
-                                </p:cTn>
-                              </p:par>
-                            </p:childTnLst>
-                          </p:cTn>
-                        </p:par>
-                      </p:childTnLst>
-                    </p:cTn>
-                  </p:par>
-                  <p:par>
-                    <p:cTn id="21" fill="hold">
-                      <p:stCondLst>
-                        <p:cond delay="indefinite"/>
-                      </p:stCondLst>
-                      <p:childTnLst>
-                        <p:par>
-                          <p:cTn id="22" fill="hold">
-                            <p:stCondLst>
-                              <p:cond delay="0"/>
-                            </p:stCondLst>
-                            <p:childTnLst>
-                              <p:par>
-                                <p:cTn id="23" presetID="10" presetClass="entr" presetSubtype="0" fill="hold" nodeType="clickEffect">
-                                  <p:stCondLst>
-                                    <p:cond delay="0"/>
-                                  </p:stCondLst>
-                                  <p:childTnLst>
-                                    <p:set>
-                                      <p:cBhvr>
-                                        <p:cTn id="24" dur="1" fill="hold">
-                                          <p:stCondLst>
-                                            <p:cond delay="0"/>
-                                          </p:stCondLst>
-                                        </p:cTn>
-                                        <p:tgtEl>
-                                          <p:spTgt spid="6">
-                                            <p:txEl>
-                                              <p:pRg st="2" end="2"/>
-                                            </p:txEl>
-                                          </p:spTgt>
-                                        </p:tgtEl>
-                                        <p:attrNameLst>
-                                          <p:attrName>style.visibility</p:attrName>
-                                        </p:attrNameLst>
-                                      </p:cBhvr>
-                                      <p:to>
-                                        <p:strVal val="visible"/>
-                                      </p:to>
-                                    </p:set>
-                                    <p:animEffect transition="in" filter="fade">
-                                      <p:cBhvr>
-                                        <p:cTn id="25" dur="500"/>
-                                        <p:tgtEl>
-                                          <p:spTgt spid="6">
-                                            <p:txEl>
-                                              <p:pRg st="2" end="2"/>
-                                            </p:txEl>
-                                          </p:spTgt>
-                                        </p:tgtEl>
-                                      </p:cBhvr>
-                                    </p:animEffect>
-                                  </p:childTnLst>
-                                </p:cTn>
-                              </p:par>
-                            </p:childTnLst>
-                          </p:cTn>
-                        </p:par>
-                      </p:childTnLst>
-                    </p:cTn>
-                  </p:par>
                 </p:childTnLst>
               </p:cTn>
               <p:prevCondLst>
@@ -4885,80 +4610,6 @@
               </a:solidFill>
               <a:latin typeface="Soho Std ExtraBold Condensed" pitchFamily="18" charset="0"/>
             </a:endParaRPr>
-          </a:p>
-        </p:txBody>
-      </p:sp>
-      <p:sp>
-        <p:nvSpPr>
-          <p:cNvPr id="6" name="TextBox 5"/>
-          <p:cNvSpPr txBox="1"/>
-          <p:nvPr/>
-        </p:nvSpPr>
-        <p:spPr>
-          <a:xfrm>
-            <a:off x="597117" y="1661403"/>
-            <a:ext cx="7661731" cy="1938992"/>
-          </a:xfrm>
-          <a:prstGeom prst="rect">
-            <a:avLst/>
-          </a:prstGeom>
-          <a:noFill/>
-        </p:spPr>
-        <p:txBody>
-          <a:bodyPr wrap="square" rtlCol="0">
-            <a:spAutoFit/>
-          </a:bodyPr>
-          <a:lstStyle/>
-          <a:p>
-            <a:pPr marL="571500" indent="-571500">
-              <a:buFont typeface="Arial" pitchFamily="34" charset="0"/>
-              <a:buChar char="•"/>
-            </a:pPr>
-            <a:r>
-              <a:rPr lang="en-US" sz="3000" dirty="0" smtClean="0">
-                <a:latin typeface="Soho Std" pitchFamily="18" charset="0"/>
-              </a:rPr>
-              <a:t>Set and forget</a:t>
-            </a:r>
-          </a:p>
-          <a:p>
-            <a:pPr marL="571500" indent="-571500">
-              <a:buFont typeface="Arial" pitchFamily="34" charset="0"/>
-              <a:buChar char="•"/>
-            </a:pPr>
-            <a:r>
-              <a:rPr lang="en-US" sz="3000" dirty="0" smtClean="0">
-                <a:latin typeface="Soho Std" pitchFamily="18" charset="0"/>
-              </a:rPr>
-              <a:t>Private methods</a:t>
-            </a:r>
-          </a:p>
-          <a:p>
-            <a:pPr marL="571500" indent="-571500">
-              <a:buFont typeface="Arial" pitchFamily="34" charset="0"/>
-              <a:buChar char="•"/>
-            </a:pPr>
-            <a:r>
-              <a:rPr lang="en-US" sz="3000" dirty="0" smtClean="0">
-                <a:latin typeface="Soho Std" pitchFamily="18" charset="0"/>
-              </a:rPr>
-              <a:t>Automated</a:t>
-            </a:r>
-            <a:endParaRPr lang="en-US" sz="3000" dirty="0">
-              <a:latin typeface="Soho Std" pitchFamily="18" charset="0"/>
-            </a:endParaRPr>
-          </a:p>
-          <a:p>
-            <a:pPr marL="571500" indent="-571500">
-              <a:buFont typeface="Arial" pitchFamily="34" charset="0"/>
-              <a:buChar char="•"/>
-            </a:pPr>
-            <a:r>
-              <a:rPr lang="en-US" sz="3000" dirty="0" smtClean="0">
-                <a:latin typeface="Soho Std" pitchFamily="18" charset="0"/>
-              </a:rPr>
-              <a:t>Simple</a:t>
-            </a:r>
           </a:p>
         </p:txBody>
       </p:sp>
@@ -5077,7 +4728,7 @@
                                           </p:stCondLst>
                                         </p:cTn>
                                         <p:tgtEl>
-                                          <p:spTgt spid="4"/>
+                                          <p:spTgt spid="7"/>
                                         </p:tgtEl>
                                         <p:attrNameLst>
                                           <p:attrName>style.visibility</p:attrName>
@@ -5091,50 +4742,28 @@
                                       <p:cBhvr>
                                         <p:cTn id="7" dur="500"/>
                                         <p:tgtEl>
-                                          <p:spTgt spid="4"/>
+                                          <p:spTgt spid="7"/>
                                         </p:tgtEl>
                                       </p:cBhvr>
                                     </p:animEffect>
                                   </p:childTnLst>
                                 </p:cTn>
                               </p:par>
-                            </p:childTnLst>
-                          </p:cTn>
-                        </p:par>
-                      </p:childTnLst>
-                    </p:cTn>
-                  </p:par>
-                  <p:par>
-                    <p:cTn id="8" fill="hold">
-                      <p:stCondLst>
-                        <p:cond delay="indefinite"/>
-                      </p:stCondLst>
-                      <p:childTnLst>
-                        <p:par>
-                          <p:cTn id="9" fill="hold">
-                            <p:stCondLst>
-                              <p:cond delay="0"/>
-                            </p:stCondLst>
-                            <p:childTnLst>
                               <p:par>
-                                <p:cTn id="10" presetID="10" presetClass="entr" presetSubtype="0" fill="hold" nodeType="clickEffect">
+                                <p:cTn id="8" presetID="10" presetClass="entr" presetSubtype="0" fill="hold" grpId="0" nodeType="withEffect">
                                   <p:stCondLst>
                                     <p:cond delay="0"/>
                                   </p:stCondLst>
                                   <p:childTnLst>
                                     <p:set>
                                       <p:cBhvr>
-                                        <p:cTn id="11" dur="1" fill="hold">
+                                        <p:cTn id="9" dur="1" fill="hold">
                                           <p:stCondLst>
                                             <p:cond delay="0"/>
                                           </p:stCondLst>
                                         </p:cTn>
                                         <p:tgtEl>
-                                          <p:spTgt spid="6">
-                                            <p:txEl>
-                                              <p:pRg st="0" end="0"/>
-                                            </p:txEl>
-                                          </p:spTgt>
+                                          <p:spTgt spid="4"/>
                                         </p:tgtEl>
                                         <p:attrNameLst>
                                           <p:attrName>style.visibility</p:attrName>
@@ -5146,231 +4775,9 @@
                                     </p:set>
                                     <p:animEffect transition="in" filter="fade">
                                       <p:cBhvr>
-                                        <p:cTn id="12" dur="500"/>
+                                        <p:cTn id="10" dur="500"/>
                                         <p:tgtEl>
-                                          <p:spTgt spid="6">
-                                            <p:txEl>
-                                              <p:pRg st="0" end="0"/>
-                                            </p:txEl>
-                                          </p:spTgt>
-                                        </p:tgtEl>
-                                      </p:cBhvr>
-                                    </p:animEffect>
-                                  </p:childTnLst>
-                                </p:cTn>
-                              </p:par>
-                            </p:childTnLst>
-                          </p:cTn>
-                        </p:par>
-                      </p:childTnLst>
-                    </p:cTn>
-                  </p:par>
-                  <p:par>
-                    <p:cTn id="13" fill="hold">
-                      <p:stCondLst>
-                        <p:cond delay="indefinite"/>
-                      </p:stCondLst>
-                      <p:childTnLst>
-                        <p:par>
-                          <p:cTn id="14" fill="hold">
-                            <p:stCondLst>
-                              <p:cond delay="0"/>
-                            </p:stCondLst>
-                            <p:childTnLst>
-                              <p:par>
-                                <p:cTn id="15" presetID="10" presetClass="entr" presetSubtype="0" fill="hold" nodeType="clickEffect">
-                                  <p:stCondLst>
-                                    <p:cond delay="0"/>
-                                  </p:stCondLst>
-                                  <p:childTnLst>
-                                    <p:set>
-                                      <p:cBhvr>
-                                        <p:cTn id="16" dur="1" fill="hold">
-                                          <p:stCondLst>
-                                            <p:cond delay="0"/>
-                                          </p:stCondLst>
-                                        </p:cTn>
-                                        <p:tgtEl>
-                                          <p:spTgt spid="6">
-                                            <p:txEl>
-                                              <p:pRg st="1" end="1"/>
-                                            </p:txEl>
-                                          </p:spTgt>
-                                        </p:tgtEl>
-                                        <p:attrNameLst>
-                                          <p:attrName>style.visibility</p:attrName>
-                                        </p:attrNameLst>
-                                      </p:cBhvr>
-                                      <p:to>
-                                        <p:strVal val="visible"/>
-                                      </p:to>
-                                    </p:set>
-                                    <p:animEffect transition="in" filter="fade">
-                                      <p:cBhvr>
-                                        <p:cTn id="17" dur="500"/>
-                                        <p:tgtEl>
-                                          <p:spTgt spid="6">
-                                            <p:txEl>
-                                              <p:pRg st="1" end="1"/>
-                                            </p:txEl>
-                                          </p:spTgt>
-                                        </p:tgtEl>
-                                      </p:cBhvr>
-                                    </p:animEffect>
-                                  </p:childTnLst>
-                                </p:cTn>
-                              </p:par>
-                            </p:childTnLst>
-                          </p:cTn>
-                        </p:par>
-                      </p:childTnLst>
-                    </p:cTn>
-                  </p:par>
-                  <p:par>
-                    <p:cTn id="18" fill="hold">
-                      <p:stCondLst>
-                        <p:cond delay="indefinite"/>
-                      </p:stCondLst>
-                      <p:childTnLst>
-                        <p:par>
-                          <p:cTn id="19" fill="hold">
-                            <p:stCondLst>
-                              <p:cond delay="0"/>
-                            </p:stCondLst>
-                            <p:childTnLst>
-                              <p:par>
-                                <p:cTn id="20" presetID="10" presetClass="entr" presetSubtype="0" fill="hold" nodeType="clickEffect">
-                                  <p:stCondLst>
-                                    <p:cond delay="0"/>
-                                  </p:stCondLst>
-                                  <p:childTnLst>
-                                    <p:set>
-                                      <p:cBhvr>
-                                        <p:cTn id="21" dur="1" fill="hold">
-                                          <p:stCondLst>
-                                            <p:cond delay="0"/>
-                                          </p:stCondLst>
-                                        </p:cTn>
-                                        <p:tgtEl>
-                                          <p:spTgt spid="6">
-                                            <p:txEl>
-                                              <p:pRg st="2" end="2"/>
-                                            </p:txEl>
-                                          </p:spTgt>
-                                        </p:tgtEl>
-                                        <p:attrNameLst>
-                                          <p:attrName>style.visibility</p:attrName>
-                                        </p:attrNameLst>
-                                      </p:cBhvr>
-                                      <p:to>
-                                        <p:strVal val="visible"/>
-                                      </p:to>
-                                    </p:set>
-                                    <p:animEffect transition="in" filter="fade">
-                                      <p:cBhvr>
-                                        <p:cTn id="22" dur="500"/>
-                                        <p:tgtEl>
-                                          <p:spTgt spid="6">
-                                            <p:txEl>
-                                              <p:pRg st="2" end="2"/>
-                                            </p:txEl>
-                                          </p:spTgt>
-                                        </p:tgtEl>
-                                      </p:cBhvr>
-                                    </p:animEffect>
-                                  </p:childTnLst>
-                                </p:cTn>
-                              </p:par>
-                            </p:childTnLst>
-                          </p:cTn>
-                        </p:par>
-                      </p:childTnLst>
-                    </p:cTn>
-                  </p:par>
-                  <p:par>
-                    <p:cTn id="23" fill="hold">
-                      <p:stCondLst>
-                        <p:cond delay="indefinite"/>
-                      </p:stCondLst>
-                      <p:childTnLst>
-                        <p:par>
-                          <p:cTn id="24" fill="hold">
-                            <p:stCondLst>
-                              <p:cond delay="0"/>
-                            </p:stCondLst>
-                            <p:childTnLst>
-                              <p:par>
-                                <p:cTn id="25" presetID="10" presetClass="entr" presetSubtype="0" fill="hold" nodeType="clickEffect">
-                                  <p:stCondLst>
-                                    <p:cond delay="0"/>
-                                  </p:stCondLst>
-                                  <p:childTnLst>
-                                    <p:set>
-                                      <p:cBhvr>
-                                        <p:cTn id="26" dur="1" fill="hold">
-                                          <p:stCondLst>
-                                            <p:cond delay="0"/>
-                                          </p:stCondLst>
-                                        </p:cTn>
-                                        <p:tgtEl>
-                                          <p:spTgt spid="6">
-                                            <p:txEl>
-                                              <p:pRg st="3" end="3"/>
-                                            </p:txEl>
-                                          </p:spTgt>
-                                        </p:tgtEl>
-                                        <p:attrNameLst>
-                                          <p:attrName>style.visibility</p:attrName>
-                                        </p:attrNameLst>
-                                      </p:cBhvr>
-                                      <p:to>
-                                        <p:strVal val="visible"/>
-                                      </p:to>
-                                    </p:set>
-                                    <p:animEffect transition="in" filter="fade">
-                                      <p:cBhvr>
-                                        <p:cTn id="27" dur="500"/>
-                                        <p:tgtEl>
-                                          <p:spTgt spid="6">
-                                            <p:txEl>
-                                              <p:pRg st="3" end="3"/>
-                                            </p:txEl>
-                                          </p:spTgt>
-                                        </p:tgtEl>
-                                      </p:cBhvr>
-                                    </p:animEffect>
-                                  </p:childTnLst>
-                                </p:cTn>
-                              </p:par>
-                              <p:par>
-                                <p:cTn id="28" presetID="10" presetClass="entr" presetSubtype="0" fill="hold" grpId="0" nodeType="withEffect">
-                                  <p:stCondLst>
-                                    <p:cond delay="0"/>
-                                  </p:stCondLst>
-                                  <p:childTnLst>
-                                    <p:set>
-                                      <p:cBhvr>
-                                        <p:cTn id="29" dur="1" fill="hold">
-                                          <p:stCondLst>
-                                            <p:cond delay="0"/>
-                                          </p:stCondLst>
-                                        </p:cTn>
-                                        <p:tgtEl>
-                                          <p:spTgt spid="7"/>
-                                        </p:tgtEl>
-                                        <p:attrNameLst>
-                                          <p:attrName>style.visibility</p:attrName>
-                                        </p:attrNameLst>
-                                      </p:cBhvr>
-                                      <p:to>
-                                        <p:strVal val="visible"/>
-                                      </p:to>
-                                    </p:set>
-                                    <p:animEffect transition="in" filter="fade">
-                                      <p:cBhvr>
-                                        <p:cTn id="30" dur="500"/>
-                                        <p:tgtEl>
-                                          <p:spTgt spid="7"/>
+                                          <p:spTgt spid="4"/>
                                         </p:tgtEl>
                                       </p:cBhvr>
                                     </p:animEffect>
@@ -5863,43 +5270,71 @@
             <a:spLocks noGrp="1"/>
           </p:cNvSpPr>
           <p:nvPr>
-            <p:ph type="title"/>
-          </p:nvPr>
-        </p:nvSpPr>
-        <p:spPr/>
-        <p:txBody>
-          <a:bodyPr/>
+            <p:ph type="ctrTitle"/>
+          </p:nvPr>
+        </p:nvSpPr>
+        <p:spPr>
+          <a:xfrm>
+            <a:off x="304800" y="2057400"/>
+            <a:ext cx="7772400" cy="4572000"/>
+          </a:xfrm>
+        </p:spPr>
+        <p:txBody>
+          <a:bodyPr>
+            <a:noAutofit/>
+          </a:bodyPr>
           <a:lstStyle/>
           <a:p>
             <a:pPr algn="l"/>
             <a:r>
-              <a:rPr lang="en-US" dirty="0" smtClean="0"/>
-              <a:t>QUESTIONS?</a:t>
-            </a:r>
-            <a:endParaRPr lang="en-US" dirty="0"/>
-          </a:p>
-        </p:txBody>
-      </p:sp>
-      <p:sp>
-        <p:nvSpPr>
-          <p:cNvPr id="3" name="Footer Placeholder 2"/>
-          <p:cNvSpPr>
-            <a:spLocks noGrp="1"/>
-          </p:cNvSpPr>
-          <p:nvPr>
-            <p:ph type="ftr" sz="quarter" idx="11"/>
-          </p:nvPr>
-        </p:nvSpPr>
-        <p:spPr/>
-        <p:txBody>
-          <a:bodyPr/>
-          <a:lstStyle/>
-          <a:p>
-            <a:r>
-              <a:rPr lang="en-US" smtClean="0"/>
-              <a:t>github.com/adamclerk/FunWithPowershell2012</a:t>
-            </a:r>
-            <a:endParaRPr lang="en-US"/>
+              <a:rPr lang="en-US" sz="10000" dirty="0" smtClean="0">
+                <a:solidFill>
+                  <a:schemeClr val="accent3"/>
+                </a:solidFill>
+                <a:latin typeface="Soho Std ExtraBold Condensed" pitchFamily="18" charset="0"/>
+              </a:rPr>
+              <a:t>FUN</a:t>
+            </a:r>
+            <a:br>
+              <a:rPr lang="en-US" sz="10000" dirty="0" smtClean="0">
+                <a:solidFill>
+                  <a:schemeClr val="accent3"/>
+                </a:solidFill>
+                <a:latin typeface="Soho Std ExtraBold Condensed" pitchFamily="18" charset="0"/>
+              </a:rPr>
+            </a:br>
+            <a:r>
+              <a:rPr lang="en-US" sz="10000" dirty="0" smtClean="0">
+                <a:solidFill>
+                  <a:schemeClr val="accent3"/>
+                </a:solidFill>
+                <a:latin typeface="Soho Std ExtraBold Condensed" pitchFamily="18" charset="0"/>
+              </a:rPr>
+              <a:t>WITH</a:t>
+            </a:r>
+            <a:br>
+              <a:rPr lang="en-US" sz="10000" dirty="0" smtClean="0">
+                <a:solidFill>
+                  <a:schemeClr val="accent3"/>
+                </a:solidFill>
+                <a:latin typeface="Soho Std ExtraBold Condensed" pitchFamily="18" charset="0"/>
+              </a:rPr>
+            </a:br>
+            <a:r>
+              <a:rPr lang="en-US" sz="10000" dirty="0" smtClean="0">
+                <a:solidFill>
+                  <a:schemeClr val="accent3"/>
+                </a:solidFill>
+                <a:latin typeface="Soho Std ExtraBold Condensed" pitchFamily="18" charset="0"/>
+              </a:rPr>
+              <a:t>POWERSHELL</a:t>
+            </a:r>
+            <a:endParaRPr lang="en-US" sz="10000" dirty="0">
+              <a:solidFill>
+                <a:schemeClr val="accent3"/>
+              </a:solidFill>
+              <a:latin typeface="Soho Std ExtraBold Condensed" pitchFamily="18" charset="0"/>
+            </a:endParaRPr>
           </a:p>
         </p:txBody>
       </p:sp>
@@ -5911,8 +5346,8 @@
         </p:nvSpPr>
         <p:spPr>
           <a:xfrm>
-            <a:off x="654724" y="1931218"/>
-            <a:ext cx="7949766" cy="2492990"/>
+            <a:off x="5791200" y="228600"/>
+            <a:ext cx="3124200" cy="1538883"/>
           </a:xfrm>
           <a:prstGeom prst="rect">
             <a:avLst/>
@@ -5925,308 +5360,70 @@
           </a:bodyPr>
           <a:lstStyle/>
           <a:p>
-            <a:r>
-              <a:rPr lang="en-US" sz="1200" dirty="0" smtClean="0">
+            <a:pPr algn="r"/>
+            <a:r>
+              <a:rPr lang="en-US" sz="4000" dirty="0" smtClean="0">
+                <a:solidFill>
+                  <a:schemeClr val="tx2"/>
+                </a:solidFill>
                 <a:latin typeface="Soho Std" pitchFamily="18" charset="0"/>
               </a:rPr>
-              <a:t>Slide 1: </a:t>
-            </a:r>
-          </a:p>
-          <a:p>
-            <a:r>
-              <a:rPr lang="en-US" sz="1200" dirty="0" smtClean="0">
+              <a:t>Adam Clark</a:t>
+            </a:r>
+          </a:p>
+          <a:p>
+            <a:pPr algn="r"/>
+            <a:r>
+              <a:rPr lang="en-US" dirty="0" smtClean="0">
+                <a:solidFill>
+                  <a:schemeClr val="tx2"/>
+                </a:solidFill>
                 <a:latin typeface="Soho Std" pitchFamily="18" charset="0"/>
               </a:rPr>
-              <a:t>         [pictures</a:t>
-            </a:r>
-            <a:r>
-              <a:rPr lang="en-US" sz="1200" dirty="0">
+              <a:t>Boise Code Camp 2012</a:t>
+            </a:r>
+            <a:br>
+              <a:rPr lang="en-US" dirty="0" smtClean="0">
+                <a:solidFill>
+                  <a:schemeClr val="tx2"/>
+                </a:solidFill>
                 <a:latin typeface="Soho Std" pitchFamily="18" charset="0"/>
               </a:rPr>
-              <a:t>] </a:t>
-            </a:r>
-            <a:r>
-              <a:rPr lang="en-US" sz="1200" dirty="0">
-                <a:latin typeface="Soho Std" pitchFamily="18" charset="0"/>
-                <a:hlinkClick r:id="rId2"/>
-              </a:rPr>
-              <a:t>Create a custom </a:t>
-            </a:r>
-            <a:r>
-              <a:rPr lang="en-US" sz="1200" dirty="0" err="1">
-                <a:latin typeface="Soho Std" pitchFamily="18" charset="0"/>
-                <a:hlinkClick r:id="rId2"/>
-              </a:rPr>
-              <a:t>powershell</a:t>
-            </a:r>
-            <a:r>
-              <a:rPr lang="en-US" sz="1200" dirty="0">
-                <a:latin typeface="Soho Std" pitchFamily="18" charset="0"/>
-                <a:hlinkClick r:id="rId2"/>
-              </a:rPr>
-              <a:t> </a:t>
-            </a:r>
-            <a:r>
-              <a:rPr lang="en-US" sz="1200" dirty="0" err="1">
-                <a:latin typeface="Soho Std" pitchFamily="18" charset="0"/>
-                <a:hlinkClick r:id="rId2"/>
-              </a:rPr>
-              <a:t>cmdlet</a:t>
-            </a:r>
-            <a:r>
-              <a:rPr lang="en-US" sz="1200" dirty="0">
-                <a:latin typeface="Soho Std" pitchFamily="18" charset="0"/>
-                <a:hlinkClick r:id="rId2"/>
-              </a:rPr>
-              <a:t> “Hello World..!” VS2010 + .NET </a:t>
-            </a:r>
-            <a:r>
-              <a:rPr lang="en-US" sz="1200" dirty="0" err="1">
-                <a:latin typeface="Soho Std" pitchFamily="18" charset="0"/>
-                <a:hlinkClick r:id="rId2"/>
-              </a:rPr>
-              <a:t>Framwork</a:t>
-            </a:r>
-            <a:r>
-              <a:rPr lang="en-US" sz="1200" dirty="0">
-                <a:latin typeface="Soho Std" pitchFamily="18" charset="0"/>
-                <a:hlinkClick r:id="rId2"/>
-              </a:rPr>
-              <a:t> 4 + </a:t>
-            </a:r>
-            <a:r>
-              <a:rPr lang="en-US" sz="1200" dirty="0" err="1">
-                <a:latin typeface="Soho Std" pitchFamily="18" charset="0"/>
-                <a:hlinkClick r:id="rId2"/>
-              </a:rPr>
-              <a:t>Powershell</a:t>
-            </a:r>
-            <a:r>
-              <a:rPr lang="en-US" sz="1200" dirty="0">
-                <a:latin typeface="Soho Std" pitchFamily="18" charset="0"/>
-                <a:hlinkClick r:id="rId2"/>
-              </a:rPr>
-              <a:t> </a:t>
-            </a:r>
-            <a:r>
-              <a:rPr lang="en-US" sz="1200" dirty="0" smtClean="0">
-                <a:latin typeface="Soho Std" pitchFamily="18" charset="0"/>
-                <a:hlinkClick r:id="rId2"/>
-              </a:rPr>
-              <a:t>2.0</a:t>
-            </a:r>
-            <a:endParaRPr lang="en-US" sz="1200" dirty="0" smtClean="0">
-              <a:latin typeface="Soho Std" pitchFamily="18" charset="0"/>
-            </a:endParaRPr>
-          </a:p>
-          <a:p>
-            <a:r>
-              <a:rPr lang="en-US" sz="1200" dirty="0" smtClean="0">
+            </a:br>
+            <a:r>
+              <a:rPr lang="en-US" dirty="0" smtClean="0">
+                <a:solidFill>
+                  <a:schemeClr val="tx2"/>
+                </a:solidFill>
                 <a:latin typeface="Soho Std" pitchFamily="18" charset="0"/>
               </a:rPr>
-              <a:t>Slide 4+6:</a:t>
-            </a:r>
-          </a:p>
-          <a:p>
-            <a:r>
-              <a:rPr lang="en-US" sz="1200" dirty="0" smtClean="0">
+              <a:t>adamclerk@gmail.com</a:t>
+            </a:r>
+          </a:p>
+          <a:p>
+            <a:pPr algn="r"/>
+            <a:r>
+              <a:rPr lang="en-US" dirty="0" smtClean="0">
+                <a:solidFill>
+                  <a:schemeClr val="tx2"/>
+                </a:solidFill>
                 <a:latin typeface="Soho Std" pitchFamily="18" charset="0"/>
               </a:rPr>
-              <a:t>         [</a:t>
-            </a:r>
-            <a:r>
-              <a:rPr lang="en-US" sz="1200" dirty="0" err="1" smtClean="0">
+              <a:t>github.com/</a:t>
+            </a:r>
+            <a:r>
+              <a:rPr lang="en-US" dirty="0" err="1" smtClean="0">
+                <a:solidFill>
+                  <a:schemeClr val="tx2"/>
+                </a:solidFill>
                 <a:latin typeface="Soho Std" pitchFamily="18" charset="0"/>
               </a:rPr>
-              <a:t>datasource</a:t>
-            </a:r>
-            <a:r>
-              <a:rPr lang="en-US" sz="1200" dirty="0">
-                <a:latin typeface="Soho Std" pitchFamily="18" charset="0"/>
-              </a:rPr>
-              <a:t>] </a:t>
-            </a:r>
-            <a:r>
-              <a:rPr lang="en-US" sz="1200" dirty="0" smtClean="0">
-                <a:latin typeface="Soho Std" pitchFamily="18" charset="0"/>
-                <a:hlinkClick r:id="rId3"/>
-              </a:rPr>
-              <a:t>NOAA - XML </a:t>
-            </a:r>
-            <a:r>
-              <a:rPr lang="en-US" sz="1200" dirty="0">
-                <a:latin typeface="Soho Std" pitchFamily="18" charset="0"/>
-                <a:hlinkClick r:id="rId3"/>
-              </a:rPr>
-              <a:t>Feeds of Current Weather Conditions </a:t>
-            </a:r>
-            <a:endParaRPr lang="en-US" sz="1200" dirty="0" smtClean="0">
-              <a:latin typeface="Soho Std" pitchFamily="18" charset="0"/>
-            </a:endParaRPr>
-          </a:p>
-          <a:p>
-            <a:r>
-              <a:rPr lang="en-US" sz="1200" dirty="0" smtClean="0">
-                <a:latin typeface="Soho Std" pitchFamily="18" charset="0"/>
-              </a:rPr>
-              <a:t>Slide 7:</a:t>
-            </a:r>
-          </a:p>
-          <a:p>
-            <a:r>
-              <a:rPr lang="en-US" sz="1200" dirty="0" smtClean="0">
-                <a:latin typeface="Soho Std" pitchFamily="18" charset="0"/>
-              </a:rPr>
-              <a:t>         [</a:t>
-            </a:r>
-            <a:r>
-              <a:rPr lang="en-US" sz="1200" dirty="0">
-                <a:latin typeface="Soho Std" pitchFamily="18" charset="0"/>
-              </a:rPr>
-              <a:t>code] </a:t>
-            </a:r>
-            <a:r>
-              <a:rPr lang="en-US" sz="1200" dirty="0">
-                <a:latin typeface="Soho Std" pitchFamily="18" charset="0"/>
-                <a:hlinkClick r:id="rId4"/>
-              </a:rPr>
-              <a:t>Count-Object </a:t>
-            </a:r>
-            <a:r>
-              <a:rPr lang="en-US" sz="1200" dirty="0" smtClean="0">
-                <a:latin typeface="Soho Std" pitchFamily="18" charset="0"/>
-                <a:hlinkClick r:id="rId4"/>
-              </a:rPr>
-              <a:t>– </a:t>
-            </a:r>
-            <a:r>
-              <a:rPr lang="en-US" sz="1200" dirty="0" err="1" smtClean="0">
-                <a:latin typeface="Soho Std" pitchFamily="18" charset="0"/>
-                <a:hlinkClick r:id="rId4"/>
-              </a:rPr>
-              <a:t>jaredpar’s</a:t>
-            </a:r>
-            <a:r>
-              <a:rPr lang="en-US" sz="1200" dirty="0" smtClean="0">
-                <a:latin typeface="Soho Std" pitchFamily="18" charset="0"/>
-                <a:hlinkClick r:id="rId4"/>
-              </a:rPr>
-              <a:t> </a:t>
-            </a:r>
-            <a:r>
-              <a:rPr lang="en-US" sz="1200" dirty="0" err="1">
-                <a:latin typeface="Soho Std" pitchFamily="18" charset="0"/>
-                <a:hlinkClick r:id="rId4"/>
-              </a:rPr>
-              <a:t>WebLog</a:t>
-            </a:r>
-            <a:r>
-              <a:rPr lang="en-US" sz="1200" dirty="0">
-                <a:latin typeface="Soho Std" pitchFamily="18" charset="0"/>
-                <a:hlinkClick r:id="rId4"/>
-              </a:rPr>
-              <a:t> - Site Home - MSDN </a:t>
-            </a:r>
-            <a:r>
-              <a:rPr lang="en-US" sz="1200" dirty="0" smtClean="0">
-                <a:latin typeface="Soho Std" pitchFamily="18" charset="0"/>
-                <a:hlinkClick r:id="rId4"/>
-              </a:rPr>
-              <a:t>Blogs</a:t>
-            </a:r>
-            <a:endParaRPr lang="en-US" sz="1200" dirty="0" smtClean="0">
-              <a:latin typeface="Soho Std" pitchFamily="18" charset="0"/>
-            </a:endParaRPr>
-          </a:p>
-          <a:p>
-            <a:r>
-              <a:rPr lang="en-US" sz="1200" dirty="0" smtClean="0">
-                <a:latin typeface="Soho Std" pitchFamily="18" charset="0"/>
-              </a:rPr>
-              <a:t>Slide 10:</a:t>
-            </a:r>
-          </a:p>
-          <a:p>
-            <a:r>
-              <a:rPr lang="en-US" sz="1200" dirty="0" smtClean="0">
-                <a:latin typeface="Soho Std" pitchFamily="18" charset="0"/>
-              </a:rPr>
-              <a:t>         [code</a:t>
-            </a:r>
-            <a:r>
-              <a:rPr lang="en-US" sz="1200" dirty="0">
-                <a:latin typeface="Soho Std" pitchFamily="18" charset="0"/>
-              </a:rPr>
-              <a:t>] </a:t>
-            </a:r>
-            <a:r>
-              <a:rPr lang="en-US" sz="1200" dirty="0">
-                <a:latin typeface="Soho Std" pitchFamily="18" charset="0"/>
-                <a:hlinkClick r:id="rId5"/>
-              </a:rPr>
-              <a:t>Check Gmail inbox via Windows 7 </a:t>
-            </a:r>
-            <a:r>
-              <a:rPr lang="en-US" sz="1200" dirty="0" smtClean="0">
-                <a:latin typeface="Soho Std" pitchFamily="18" charset="0"/>
-                <a:hlinkClick r:id="rId5"/>
-              </a:rPr>
-              <a:t>PowerShell</a:t>
-            </a:r>
-            <a:endParaRPr lang="en-US" sz="1200" dirty="0" smtClean="0">
-              <a:latin typeface="Soho Std" pitchFamily="18" charset="0"/>
-            </a:endParaRPr>
-          </a:p>
-          <a:p>
-            <a:r>
-              <a:rPr lang="en-US" sz="1200" dirty="0" smtClean="0">
-                <a:latin typeface="Soho Std" pitchFamily="18" charset="0"/>
-              </a:rPr>
-              <a:t>Slide 13:</a:t>
-            </a:r>
-          </a:p>
-          <a:p>
-            <a:r>
-              <a:rPr lang="en-US" sz="1200" dirty="0">
-                <a:latin typeface="Soho Std" pitchFamily="18" charset="0"/>
-              </a:rPr>
-              <a:t> </a:t>
-            </a:r>
-            <a:r>
-              <a:rPr lang="en-US" sz="1200" dirty="0" smtClean="0">
-                <a:latin typeface="Soho Std" pitchFamily="18" charset="0"/>
-              </a:rPr>
-              <a:t>        [code</a:t>
-            </a:r>
-            <a:r>
-              <a:rPr lang="en-US" sz="1200" dirty="0">
-                <a:latin typeface="Soho Std" pitchFamily="18" charset="0"/>
-              </a:rPr>
-              <a:t>] </a:t>
-            </a:r>
-            <a:r>
-              <a:rPr lang="en-US" sz="1200" dirty="0">
-                <a:latin typeface="Soho Std" pitchFamily="18" charset="0"/>
-                <a:hlinkClick r:id="rId6"/>
-              </a:rPr>
-              <a:t>Converting Secure String</a:t>
-            </a:r>
-            <a:endParaRPr lang="en-US" sz="1200" dirty="0" smtClean="0">
-              <a:latin typeface="Soho Std" pitchFamily="18" charset="0"/>
-            </a:endParaRPr>
-          </a:p>
-          <a:p>
-            <a:endParaRPr lang="en-US" sz="1200" dirty="0" smtClean="0">
-              <a:latin typeface="Soho Std" pitchFamily="18" charset="0"/>
-            </a:endParaRPr>
-          </a:p>
-          <a:p>
-            <a:endParaRPr lang="en-US" sz="1200" dirty="0" smtClean="0">
-              <a:latin typeface="Soho Std" pitchFamily="18" charset="0"/>
-            </a:endParaRPr>
-          </a:p>
-          <a:p>
-            <a:endParaRPr lang="en-US" sz="1200" dirty="0">
+              <a:t>adamclerk</a:t>
+            </a:r>
+            <a:endParaRPr lang="en-US" dirty="0" smtClean="0">
+              <a:solidFill>
+                <a:schemeClr val="tx2"/>
+              </a:solidFill>
               <a:latin typeface="Soho Std" pitchFamily="18" charset="0"/>
             </a:endParaRPr>
           </a:p>
@@ -6235,7 +5432,7 @@
     </p:spTree>
     <p:extLst>
       <p:ext uri="{BB962C8B-B14F-4D97-AF65-F5344CB8AC3E}">
-        <p14:creationId xmlns:p14="http://schemas.microsoft.com/office/powerpoint/2010/main" val="2302438264"/>
+        <p14:creationId xmlns:p14="http://schemas.microsoft.com/office/powerpoint/2010/main" val="4178707833"/>
       </p:ext>
     </p:extLst>
   </p:cSld>
@@ -6266,7 +5463,7 @@
                             </p:stCondLst>
                             <p:childTnLst>
                               <p:par>
-                                <p:cTn id="5" presetID="10" presetClass="entr" presetSubtype="0" fill="hold" grpId="0" nodeType="withEffect">
+                                <p:cTn id="5" presetID="10" presetClass="entr" presetSubtype="0" fill="hold" grpId="0" nodeType="afterEffect">
                                   <p:stCondLst>
                                     <p:cond delay="0"/>
                                   </p:stCondLst>
@@ -6303,6 +5500,50 @@
                             </p:childTnLst>
                           </p:cTn>
                         </p:par>
+                        <p:par>
+                          <p:cTn id="8" fill="hold">
+                            <p:stCondLst>
+                              <p:cond delay="500"/>
+                            </p:stCondLst>
+                            <p:childTnLst>
+                              <p:par>
+                                <p:cTn id="9" presetID="10" presetClass="entr" presetSubtype="0" fill="hold" grpId="0" nodeType="afterEffect">
+                                  <p:stCondLst>
+                                    <p:cond delay="0"/>
+                                  </p:stCondLst>
+                                  <p:childTnLst>
+                                    <p:set>
+                                      <p:cBhvr>
+                                        <p:cTn id="10" dur="1" fill="hold">
+                                          <p:stCondLst>
+                                            <p:cond delay="0"/>
+                                          </p:stCondLst>
+                                        </p:cTn>
+                                        <p:tgtEl>
+                                          <p:spTgt spid="4"/>
+                                        </p:tgtEl>
+                                        <p:attrNameLst>
+                                          <p:attrName>style.visibility</p:attrName>
+                                        </p:attrNameLst>
+                                      </p:cBhvr>
+                                      <p:to>
+                                        <p:strVal val="visible"/>
+                                      </p:to>
+                                    </p:set>
+                                    <p:animEffect transition="in" filter="fade">
+                                      <p:cBhvr>
+                                        <p:cTn id="11" dur="500"/>
+                                        <p:tgtEl>
+                                          <p:spTgt spid="4"/>
+                                        </p:tgtEl>
+                                      </p:cBhvr>
+                                    </p:animEffect>
+                                  </p:childTnLst>
+                                </p:cTn>
+                              </p:par>
+                            </p:childTnLst>
+                          </p:cTn>
+                        </p:par>
                       </p:childTnLst>
                     </p:cTn>
                   </p:par>
@@ -6329,6 +5570,7 @@
     </p:tnLst>
     <p:bldLst>
       <p:bldP spid="2" grpId="0"/>
+      <p:bldP spid="4" grpId="0"/>
     </p:bldLst>
   </p:timing>
 </p:sld>
@@ -6459,174 +5701,6 @@
           </a:p>
         </p:txBody>
       </p:sp>
-      <p:pic>
-        <p:nvPicPr>
-          <p:cNvPr id="6" name="Picture 5"/>
-          <p:cNvPicPr>
-            <a:picLocks noChangeAspect="1"/>
-          </p:cNvPicPr>
-          <p:nvPr/>
-        </p:nvPicPr>
-        <p:blipFill>
-          <a:blip r:embed="rId2">
-            <a:extLst>
-              <a:ext uri="{28A0092B-C50C-407E-A947-70E740481C1C}">
-                <a14:useLocalDpi xmlns:a14="http://schemas.microsoft.com/office/drawing/2010/main" val="0"/>
-              </a:ext>
-            </a:extLst>
-          </a:blip>
-          <a:stretch>
-            <a:fillRect/>
-          </a:stretch>
-        </p:blipFill>
-        <p:spPr>
-          <a:xfrm>
-            <a:off x="424296" y="1661403"/>
-            <a:ext cx="3977409" cy="2559376"/>
-          </a:xfrm>
-          <a:prstGeom prst="rect">
-            <a:avLst/>
-          </a:prstGeom>
-          <a:ln w="12700">
-            <a:solidFill>
-              <a:schemeClr val="bg1"/>
-            </a:solidFill>
-          </a:ln>
-          <a:effectLst>
-            <a:outerShdw blurRad="50800" dist="38100" dir="2700000" algn="tl" rotWithShape="0">
-              <a:prstClr val="black">
-                <a:alpha val="40000"/>
-              </a:prstClr>
-            </a:outerShdw>
-          </a:effectLst>
-        </p:spPr>
-      </p:pic>
-      <p:pic>
-        <p:nvPicPr>
-          <p:cNvPr id="7" name="Picture 6"/>
-          <p:cNvPicPr>
-            <a:picLocks noChangeAspect="1"/>
-          </p:cNvPicPr>
-          <p:nvPr/>
-        </p:nvPicPr>
-        <p:blipFill>
-          <a:blip r:embed="rId3">
-            <a:extLst>
-              <a:ext uri="{28A0092B-C50C-407E-A947-70E740481C1C}">
-                <a14:useLocalDpi xmlns:a14="http://schemas.microsoft.com/office/drawing/2010/main" val="0"/>
-              </a:ext>
-            </a:extLst>
-          </a:blip>
-          <a:stretch>
-            <a:fillRect/>
-          </a:stretch>
-        </p:blipFill>
-        <p:spPr>
-          <a:xfrm>
-            <a:off x="2206528" y="2138362"/>
-            <a:ext cx="3267075" cy="2581275"/>
-          </a:xfrm>
-          <a:prstGeom prst="rect">
-            <a:avLst/>
-          </a:prstGeom>
-          <a:ln w="12700">
-            <a:solidFill>
-              <a:schemeClr val="bg1"/>
-            </a:solidFill>
-          </a:ln>
-          <a:effectLst>
-            <a:outerShdw blurRad="50800" dist="38100" dir="2700000" algn="tl" rotWithShape="0">
-              <a:prstClr val="black">
-                <a:alpha val="40000"/>
-              </a:prstClr>
-            </a:outerShdw>
-          </a:effectLst>
-        </p:spPr>
-      </p:pic>
-      <p:pic>
-        <p:nvPicPr>
-          <p:cNvPr id="8" name="Picture 7"/>
-          <p:cNvPicPr>
-            <a:picLocks noChangeAspect="1"/>
-          </p:cNvPicPr>
-          <p:nvPr/>
-        </p:nvPicPr>
-        <p:blipFill>
-          <a:blip r:embed="rId4">
-            <a:extLst>
-              <a:ext uri="{28A0092B-C50C-407E-A947-70E740481C1C}">
-                <a14:useLocalDpi xmlns:a14="http://schemas.microsoft.com/office/drawing/2010/main" val="0"/>
-              </a:ext>
-            </a:extLst>
-          </a:blip>
-          <a:stretch>
-            <a:fillRect/>
-          </a:stretch>
-        </p:blipFill>
-        <p:spPr>
-          <a:xfrm>
-            <a:off x="3115313" y="2956567"/>
-            <a:ext cx="5029200" cy="1990725"/>
-          </a:xfrm>
-          <a:prstGeom prst="rect">
-            <a:avLst/>
-          </a:prstGeom>
-          <a:ln w="12700">
-            <a:solidFill>
-              <a:schemeClr val="bg1"/>
-            </a:solidFill>
-          </a:ln>
-          <a:effectLst>
-            <a:outerShdw blurRad="50800" dist="38100" dir="2700000" algn="tl" rotWithShape="0">
-              <a:prstClr val="black">
-                <a:alpha val="40000"/>
-              </a:prstClr>
-            </a:outerShdw>
-          </a:effectLst>
-        </p:spPr>
-      </p:pic>
-      <p:pic>
-        <p:nvPicPr>
-          <p:cNvPr id="9" name="Picture 8"/>
-          <p:cNvPicPr>
-            <a:picLocks noChangeAspect="1"/>
-          </p:cNvPicPr>
-          <p:nvPr/>
-        </p:nvPicPr>
-        <p:blipFill>
-          <a:blip r:embed="rId5">
-            <a:extLst>
-              <a:ext uri="{28A0092B-C50C-407E-A947-70E740481C1C}">
-                <a14:useLocalDpi xmlns:a14="http://schemas.microsoft.com/office/drawing/2010/main" val="0"/>
-              </a:ext>
-            </a:extLst>
-          </a:blip>
-          <a:stretch>
-            <a:fillRect/>
-          </a:stretch>
-        </p:blipFill>
-        <p:spPr>
-          <a:xfrm>
-            <a:off x="4583976" y="3429000"/>
-            <a:ext cx="4143375" cy="2952750"/>
-          </a:xfrm>
-          <a:prstGeom prst="rect">
-            <a:avLst/>
-          </a:prstGeom>
-          <a:ln w="12700">
-            <a:solidFill>
-              <a:schemeClr val="bg1"/>
-            </a:solidFill>
-          </a:ln>
-          <a:effectLst>
-            <a:outerShdw blurRad="50800" dist="38100" dir="2700000" algn="tl" rotWithShape="0">
-              <a:prstClr val="black">
-                <a:alpha val="40000"/>
-              </a:prstClr>
-            </a:outerShdw>
-          </a:effectLst>
-        </p:spPr>
-      </p:pic>
       <p:sp>
         <p:nvSpPr>
           <p:cNvPr id="10" name="Footer Placeholder 9"/>
@@ -6768,218 +5842,6 @@
                       </p:childTnLst>
                     </p:cTn>
                   </p:par>
-                  <p:par>
-                    <p:cTn id="12" fill="hold">
-                      <p:stCondLst>
-                        <p:cond delay="indefinite"/>
-                      </p:stCondLst>
-                      <p:childTnLst>
-                        <p:par>
-                          <p:cTn id="13" fill="hold">
-                            <p:stCondLst>
-                              <p:cond delay="0"/>
-                            </p:stCondLst>
-                            <p:childTnLst>
-                              <p:par>
-                                <p:cTn id="14" presetID="10" presetClass="entr" presetSubtype="0" fill="hold" nodeType="clickEffect">
-                                  <p:stCondLst>
-                                    <p:cond delay="0"/>
-                                  </p:stCondLst>
-                                  <p:childTnLst>
-                                    <p:set>
-                                      <p:cBhvr>
-                                        <p:cTn id="15" dur="1" fill="hold">
-                                          <p:stCondLst>
-                                            <p:cond delay="0"/>
-                                          </p:stCondLst>
-                                        </p:cTn>
-                                        <p:tgtEl>
-                                          <p:spTgt spid="6"/>
-                                        </p:tgtEl>
-                                        <p:attrNameLst>
-                                          <p:attrName>style.visibility</p:attrName>
-                                        </p:attrNameLst>
-                                      </p:cBhvr>
-                                      <p:to>
-                                        <p:strVal val="visible"/>
-                                      </p:to>
-                                    </p:set>
-                                    <p:animEffect transition="in" filter="fade">
-                                      <p:cBhvr>
-                                        <p:cTn id="16" dur="500"/>
-                                        <p:tgtEl>
-                                          <p:spTgt spid="6"/>
-                                        </p:tgtEl>
-                                      </p:cBhvr>
-                                    </p:animEffect>
-                                  </p:childTnLst>
-                                </p:cTn>
-                              </p:par>
-                            </p:childTnLst>
-                          </p:cTn>
-                        </p:par>
-                      </p:childTnLst>
-                    </p:cTn>
-                  </p:par>
-                  <p:par>
-                    <p:cTn id="17" fill="hold">
-                      <p:stCondLst>
-                        <p:cond delay="indefinite"/>
-                      </p:stCondLst>
-                      <p:childTnLst>
-                        <p:par>
-                          <p:cTn id="18" fill="hold">
-                            <p:stCondLst>
-                              <p:cond delay="0"/>
-                            </p:stCondLst>
-                            <p:childTnLst>
-                              <p:par>
-                                <p:cTn id="19" presetID="10" presetClass="entr" presetSubtype="0" fill="hold" nodeType="clickEffect">
-                                  <p:stCondLst>
-                                    <p:cond delay="0"/>
-                                  </p:stCondLst>
-                                  <p:childTnLst>
-                                    <p:set>
-                                      <p:cBhvr>
-                                        <p:cTn id="20" dur="1" fill="hold">
-                                          <p:stCondLst>
-                                            <p:cond delay="0"/>
-                                          </p:stCondLst>
-                                        </p:cTn>
-                                        <p:tgtEl>
-                                          <p:spTgt spid="7"/>
-                                        </p:tgtEl>
-                                        <p:attrNameLst>
-                                          <p:attrName>style.visibility</p:attrName>
-                                        </p:attrNameLst>
-                                      </p:cBhvr>
-                                      <p:to>
-                                        <p:strVal val="visible"/>
-                                      </p:to>
-                                    </p:set>
-                                    <p:animEffect transition="in" filter="fade">
-                                      <p:cBhvr>
-                                        <p:cTn id="21" dur="500"/>
-                                        <p:tgtEl>
-                                          <p:spTgt spid="7"/>
-                                        </p:tgtEl>
-                                      </p:cBhvr>
-                                    </p:animEffect>
-                                  </p:childTnLst>
-                                </p:cTn>
-                              </p:par>
-                            </p:childTnLst>
-                          </p:cTn>
-                        </p:par>
-                      </p:childTnLst>
-                    </p:cTn>
-                  </p:par>
-                  <p:par>
-                    <p:cTn id="22" fill="hold">
-                      <p:stCondLst>
-                        <p:cond delay="indefinite"/>
-                      </p:stCondLst>
-                      <p:childTnLst>
-                        <p:par>
-                          <p:cTn id="23" fill="hold">
-                            <p:stCondLst>
-                              <p:cond delay="0"/>
-                            </p:stCondLst>
-                            <p:childTnLst>
-                              <p:par>
-                                <p:cTn id="24" presetID="10" presetClass="entr" presetSubtype="0" fill="hold" nodeType="clickEffect">
-                                  <p:stCondLst>
-                                    <p:cond delay="0"/>
-                                  </p:stCondLst>
-                                  <p:childTnLst>
-                                    <p:set>
-                                      <p:cBhvr>
-                                        <p:cTn id="25" dur="1" fill="hold">
-                                          <p:stCondLst>
-                                            <p:cond delay="0"/>
-                                          </p:stCondLst>
-                                        </p:cTn>
-                                        <p:tgtEl>
-                                          <p:spTgt spid="8"/>
-                                        </p:tgtEl>
-                                        <p:attrNameLst>
-                                          <p:attrName>style.visibility</p:attrName>
-                                        </p:attrNameLst>
-                                      </p:cBhvr>
-                                      <p:to>
-                                        <p:strVal val="visible"/>
-                                      </p:to>
-                                    </p:set>
-                                    <p:animEffect transition="in" filter="fade">
-                                      <p:cBhvr>
-                                        <p:cTn id="26" dur="500"/>
-                                        <p:tgtEl>
-                                          <p:spTgt spid="8"/>
-                                        </p:tgtEl>
-                                      </p:cBhvr>
-                                    </p:animEffect>
-                                  </p:childTnLst>
-                                </p:cTn>
-                              </p:par>
-                            </p:childTnLst>
-                          </p:cTn>
-                        </p:par>
-                      </p:childTnLst>
-                    </p:cTn>
-                  </p:par>
-                  <p:par>
-                    <p:cTn id="27" fill="hold">
-                      <p:stCondLst>
-                        <p:cond delay="indefinite"/>
-                      </p:stCondLst>
-                      <p:childTnLst>
-                        <p:par>
-                          <p:cTn id="28" fill="hold">
-                            <p:stCondLst>
-                              <p:cond delay="0"/>
-                            </p:stCondLst>
-                            <p:childTnLst>
-                              <p:par>
-                                <p:cTn id="29" presetID="10" presetClass="entr" presetSubtype="0" fill="hold" nodeType="clickEffect">
-                                  <p:stCondLst>
-                                    <p:cond delay="0"/>
-                                  </p:stCondLst>
-                                  <p:childTnLst>
-                                    <p:set>
-                                      <p:cBhvr>
-                                        <p:cTn id="30" dur="1" fill="hold">
-                                          <p:stCondLst>
-                                            <p:cond delay="0"/>
-                                          </p:stCondLst>
-                                        </p:cTn>
-                                        <p:tgtEl>
-                                          <p:spTgt spid="9"/>
-                                        </p:tgtEl>
-                                        <p:attrNameLst>
-                                          <p:attrName>style.visibility</p:attrName>
-                                        </p:attrNameLst>
-                                      </p:cBhvr>
-                                      <p:to>
-                                        <p:strVal val="visible"/>
-                                      </p:to>
-                                    </p:set>
-                                    <p:animEffect transition="in" filter="fade">
-                                      <p:cBhvr>
-                                        <p:cTn id="31" dur="500"/>
-                                        <p:tgtEl>
-                                          <p:spTgt spid="9"/>
-                                        </p:tgtEl>
-                                      </p:cBhvr>
-                                    </p:animEffect>
-                                  </p:childTnLst>
-                                </p:cTn>
-                              </p:par>
-                            </p:childTnLst>
-                          </p:cTn>
-                        </p:par>
-                      </p:childTnLst>
-                    </p:cTn>
-                  </p:par>
                 </p:childTnLst>
               </p:cTn>
               <p:prevCondLst>
@@ -7122,152 +5984,6 @@
               </a:solidFill>
               <a:latin typeface="Soho Std" pitchFamily="18" charset="0"/>
             </a:endParaRPr>
-          </a:p>
-        </p:txBody>
-      </p:sp>
-      <p:sp>
-        <p:nvSpPr>
-          <p:cNvPr id="2" name="TextBox 1"/>
-          <p:cNvSpPr txBox="1"/>
-          <p:nvPr/>
-        </p:nvSpPr>
-        <p:spPr>
-          <a:xfrm>
-            <a:off x="597117" y="1661403"/>
-            <a:ext cx="7661731" cy="2400657"/>
-          </a:xfrm>
-          <a:prstGeom prst="rect">
-            <a:avLst/>
-          </a:prstGeom>
-          <a:noFill/>
-        </p:spPr>
-        <p:txBody>
-          <a:bodyPr wrap="square" rtlCol="0">
-            <a:spAutoFit/>
-          </a:bodyPr>
-          <a:lstStyle/>
-          <a:p>
-            <a:pPr marL="571500" indent="-571500">
-              <a:buFont typeface="Arial" pitchFamily="34" charset="0"/>
-              <a:buChar char="•"/>
-            </a:pPr>
-            <a:r>
-              <a:rPr lang="en-US" sz="3000" dirty="0" smtClean="0">
-                <a:solidFill>
-                  <a:schemeClr val="tx2">
-                    <a:lumMod val="20000"/>
-                    <a:lumOff val="80000"/>
-                  </a:schemeClr>
-                </a:solidFill>
-                <a:latin typeface="Soho Std" pitchFamily="18" charset="0"/>
-              </a:rPr>
-              <a:t>!C#</a:t>
-            </a:r>
-          </a:p>
-          <a:p>
-            <a:pPr marL="571500" indent="-571500">
-              <a:buFont typeface="Arial" pitchFamily="34" charset="0"/>
-              <a:buChar char="•"/>
-            </a:pPr>
-            <a:r>
-              <a:rPr lang="en-US" sz="3000" dirty="0" smtClean="0">
-                <a:solidFill>
-                  <a:schemeClr val="tx2">
-                    <a:lumMod val="20000"/>
-                    <a:lumOff val="80000"/>
-                  </a:schemeClr>
-                </a:solidFill>
-                <a:latin typeface="Soho Std" pitchFamily="18" charset="0"/>
-              </a:rPr>
-              <a:t>!</a:t>
-            </a:r>
-            <a:r>
-              <a:rPr lang="en-US" sz="3000" dirty="0" err="1" smtClean="0">
-                <a:solidFill>
-                  <a:schemeClr val="tx2">
-                    <a:lumMod val="20000"/>
-                    <a:lumOff val="80000"/>
-                  </a:schemeClr>
-                </a:solidFill>
-                <a:latin typeface="Soho Std" pitchFamily="18" charset="0"/>
-              </a:rPr>
-              <a:t>Compliation</a:t>
-            </a:r>
-            <a:endParaRPr lang="en-US" sz="3000" dirty="0" smtClean="0">
-              <a:solidFill>
-                <a:schemeClr val="tx2">
-                  <a:lumMod val="20000"/>
-                  <a:lumOff val="80000"/>
-                </a:schemeClr>
-              </a:solidFill>
-              <a:latin typeface="Soho Std" pitchFamily="18" charset="0"/>
-            </a:endParaRPr>
-          </a:p>
-          <a:p>
-            <a:pPr marL="571500" indent="-571500">
-              <a:buFont typeface="Arial" pitchFamily="34" charset="0"/>
-              <a:buChar char="•"/>
-            </a:pPr>
-            <a:r>
-              <a:rPr lang="en-US" sz="3000" dirty="0" smtClean="0">
-                <a:solidFill>
-                  <a:schemeClr val="tx2">
-                    <a:lumMod val="20000"/>
-                    <a:lumOff val="80000"/>
-                  </a:schemeClr>
-                </a:solidFill>
-                <a:latin typeface="Soho Std" pitchFamily="18" charset="0"/>
-              </a:rPr>
-              <a:t>!VS2010</a:t>
-            </a:r>
-          </a:p>
-          <a:p>
-            <a:pPr marL="571500" indent="-571500">
-              <a:buFont typeface="Arial" pitchFamily="34" charset="0"/>
-              <a:buChar char="•"/>
-            </a:pPr>
-            <a:r>
-              <a:rPr lang="en-US" sz="3000" dirty="0" err="1" smtClean="0">
-                <a:solidFill>
-                  <a:schemeClr val="tx2">
-                    <a:lumMod val="20000"/>
-                    <a:lumOff val="80000"/>
-                  </a:schemeClr>
-                </a:solidFill>
-                <a:latin typeface="Soho Std" pitchFamily="18" charset="0"/>
-              </a:rPr>
-              <a:t>Powershell</a:t>
-            </a:r>
-            <a:r>
-              <a:rPr lang="en-US" sz="3000" dirty="0" smtClean="0">
-                <a:solidFill>
-                  <a:schemeClr val="tx2">
-                    <a:lumMod val="20000"/>
-                    <a:lumOff val="80000"/>
-                  </a:schemeClr>
-                </a:solidFill>
-                <a:latin typeface="Soho Std" pitchFamily="18" charset="0"/>
-              </a:rPr>
-              <a:t> </a:t>
-            </a:r>
-          </a:p>
-          <a:p>
-            <a:pPr marL="571500" indent="-571500">
-              <a:buFont typeface="Arial" pitchFamily="34" charset="0"/>
-              <a:buChar char="•"/>
-            </a:pPr>
-            <a:r>
-              <a:rPr lang="en-US" sz="3000" dirty="0" smtClean="0">
-                <a:solidFill>
-                  <a:schemeClr val="tx2">
-                    <a:lumMod val="20000"/>
-                    <a:lumOff val="80000"/>
-                  </a:schemeClr>
-                </a:solidFill>
-                <a:latin typeface="Soho Std" pitchFamily="18" charset="0"/>
-              </a:rPr>
-              <a:t>Fast, Easy and Fun</a:t>
-            </a:r>
           </a:p>
         </p:txBody>
       </p:sp>
@@ -7400,311 +6116,6 @@
                                         <p:cTn id="11" dur="500"/>
                                         <p:tgtEl>
                                           <p:spTgt spid="3"/>
-                                        </p:tgtEl>
-                                      </p:cBhvr>
-                                    </p:animEffect>
-                                  </p:childTnLst>
-                                </p:cTn>
-                              </p:par>
-                            </p:childTnLst>
-                          </p:cTn>
-                        </p:par>
-                      </p:childTnLst>
-                    </p:cTn>
-                  </p:par>
-                  <p:par>
-                    <p:cTn id="12" fill="hold">
-                      <p:stCondLst>
-                        <p:cond delay="indefinite"/>
-                      </p:stCondLst>
-                      <p:childTnLst>
-                        <p:par>
-                          <p:cTn id="13" fill="hold">
-                            <p:stCondLst>
-                              <p:cond delay="0"/>
-                            </p:stCondLst>
-                            <p:childTnLst>
-                              <p:par>
-                                <p:cTn id="14" presetID="10" presetClass="entr" presetSubtype="0" fill="hold" nodeType="clickEffect">
-                                  <p:stCondLst>
-                                    <p:cond delay="0"/>
-                                  </p:stCondLst>
-                                  <p:childTnLst>
-                                    <p:set>
-                                      <p:cBhvr>
-                                        <p:cTn id="15" dur="1" fill="hold">
-                                          <p:stCondLst>
-                                            <p:cond delay="0"/>
-                                          </p:stCondLst>
-                                        </p:cTn>
-                                        <p:tgtEl>
-                                          <p:spTgt spid="2">
-                                            <p:txEl>
-                                              <p:pRg st="0" end="0"/>
-                                            </p:txEl>
-                                          </p:spTgt>
-                                        </p:tgtEl>
-                                        <p:attrNameLst>
-                                          <p:attrName>style.visibility</p:attrName>
-                                        </p:attrNameLst>
-                                      </p:cBhvr>
-                                      <p:to>
-                                        <p:strVal val="visible"/>
-                                      </p:to>
-                                    </p:set>
-                                    <p:animEffect transition="in" filter="fade">
-                                      <p:cBhvr>
-                                        <p:cTn id="16" dur="500"/>
-                                        <p:tgtEl>
-                                          <p:spTgt spid="2">
-                                            <p:txEl>
-                                              <p:pRg st="0" end="0"/>
-                                            </p:txEl>
-                                          </p:spTgt>
-                                        </p:tgtEl>
-                                      </p:cBhvr>
-                                    </p:animEffect>
-                                  </p:childTnLst>
-                                </p:cTn>
-                              </p:par>
-                            </p:childTnLst>
-                          </p:cTn>
-                        </p:par>
-                      </p:childTnLst>
-                    </p:cTn>
-                  </p:par>
-                  <p:par>
-                    <p:cTn id="17" fill="hold">
-                      <p:stCondLst>
-                        <p:cond delay="indefinite"/>
-                      </p:stCondLst>
-                      <p:childTnLst>
-                        <p:par>
-                          <p:cTn id="18" fill="hold">
-                            <p:stCondLst>
-                              <p:cond delay="0"/>
-                            </p:stCondLst>
-                            <p:childTnLst>
-                              <p:par>
-                                <p:cTn id="19" presetID="10" presetClass="entr" presetSubtype="0" fill="hold" nodeType="clickEffect">
-                                  <p:stCondLst>
-                                    <p:cond delay="0"/>
-                                  </p:stCondLst>
-                                  <p:childTnLst>
-                                    <p:set>
-                                      <p:cBhvr>
-                                        <p:cTn id="20" dur="1" fill="hold">
-                                          <p:stCondLst>
-                                            <p:cond delay="0"/>
-                                          </p:stCondLst>
-                                        </p:cTn>
-                                        <p:tgtEl>
-                                          <p:spTgt spid="2">
-                                            <p:txEl>
-                                              <p:pRg st="1" end="1"/>
-                                            </p:txEl>
-                                          </p:spTgt>
-                                        </p:tgtEl>
-                                        <p:attrNameLst>
-                                          <p:attrName>style.visibility</p:attrName>
-                                        </p:attrNameLst>
-                                      </p:cBhvr>
-                                      <p:to>
-                                        <p:strVal val="visible"/>
-                                      </p:to>
-                                    </p:set>
-                                    <p:animEffect transition="in" filter="fade">
-                                      <p:cBhvr>
-                                        <p:cTn id="21" dur="500"/>
-                                        <p:tgtEl>
-                                          <p:spTgt spid="2">
-                                            <p:txEl>
-                                              <p:pRg st="1" end="1"/>
-                                            </p:txEl>
-                                          </p:spTgt>
-                                        </p:tgtEl>
-                                      </p:cBhvr>
-                                    </p:animEffect>
-                                  </p:childTnLst>
-                                </p:cTn>
-                              </p:par>
-                            </p:childTnLst>
-                          </p:cTn>
-                        </p:par>
-                      </p:childTnLst>
-                    </p:cTn>
-                  </p:par>
-                  <p:par>
-                    <p:cTn id="22" fill="hold">
-                      <p:stCondLst>
-                        <p:cond delay="indefinite"/>
-                      </p:stCondLst>
-                      <p:childTnLst>
-                        <p:par>
-                          <p:cTn id="23" fill="hold">
-                            <p:stCondLst>
-                              <p:cond delay="0"/>
-                            </p:stCondLst>
-                            <p:childTnLst>
-                              <p:par>
-                                <p:cTn id="24" presetID="10" presetClass="entr" presetSubtype="0" fill="hold" nodeType="clickEffect">
-                                  <p:stCondLst>
-                                    <p:cond delay="0"/>
-                                  </p:stCondLst>
-                                  <p:childTnLst>
-                                    <p:set>
-                                      <p:cBhvr>
-                                        <p:cTn id="25" dur="1" fill="hold">
-                                          <p:stCondLst>
-                                            <p:cond delay="0"/>
-                                          </p:stCondLst>
-                                        </p:cTn>
-                                        <p:tgtEl>
-                                          <p:spTgt spid="2">
-                                            <p:txEl>
-                                              <p:pRg st="2" end="2"/>
-                                            </p:txEl>
-                                          </p:spTgt>
-                                        </p:tgtEl>
-                                        <p:attrNameLst>
-                                          <p:attrName>style.visibility</p:attrName>
-                                        </p:attrNameLst>
-                                      </p:cBhvr>
-                                      <p:to>
-                                        <p:strVal val="visible"/>
-                                      </p:to>
-                                    </p:set>
-                                    <p:animEffect transition="in" filter="fade">
-                                      <p:cBhvr>
-                                        <p:cTn id="26" dur="500"/>
-                                        <p:tgtEl>
-                                          <p:spTgt spid="2">
-                                            <p:txEl>
-                                              <p:pRg st="2" end="2"/>
-                                            </p:txEl>
-                                          </p:spTgt>
-                                        </p:tgtEl>
-                                      </p:cBhvr>
-                                    </p:animEffect>
-                                  </p:childTnLst>
-                                </p:cTn>
-                              </p:par>
-                            </p:childTnLst>
-                          </p:cTn>
-                        </p:par>
-                      </p:childTnLst>
-                    </p:cTn>
-                  </p:par>
-                  <p:par>
-                    <p:cTn id="27" fill="hold">
-                      <p:stCondLst>
-                        <p:cond delay="indefinite"/>
-                      </p:stCondLst>
-                      <p:childTnLst>
-                        <p:par>
-                          <p:cTn id="28" fill="hold">
-                            <p:stCondLst>
-                              <p:cond delay="0"/>
-                            </p:stCondLst>
-                            <p:childTnLst>
-                              <p:par>
-                                <p:cTn id="29" presetID="10" presetClass="entr" presetSubtype="0" fill="hold" nodeType="clickEffect">
-                                  <p:stCondLst>
-                                    <p:cond delay="0"/>
-                                  </p:stCondLst>
-                                  <p:childTnLst>
-                                    <p:set>
-                                      <p:cBhvr>
-                                        <p:cTn id="30" dur="1" fill="hold">
-                                          <p:stCondLst>
-                                            <p:cond delay="0"/>
-                                          </p:stCondLst>
-                                        </p:cTn>
-                                        <p:tgtEl>
-                                          <p:spTgt spid="2">
-                                            <p:txEl>
-                                              <p:pRg st="3" end="3"/>
-                                            </p:txEl>
-                                          </p:spTgt>
-                                        </p:tgtEl>
-                                        <p:attrNameLst>
-                                          <p:attrName>style.visibility</p:attrName>
-                                        </p:attrNameLst>
-                                      </p:cBhvr>
-                                      <p:to>
-                                        <p:strVal val="visible"/>
-                                      </p:to>
-                                    </p:set>
-                                    <p:animEffect transition="in" filter="fade">
-                                      <p:cBhvr>
-                                        <p:cTn id="31" dur="500"/>
-                                        <p:tgtEl>
-                                          <p:spTgt spid="2">
-                                            <p:txEl>
-                                              <p:pRg st="3" end="3"/>
-                                            </p:txEl>
-                                          </p:spTgt>
-                                        </p:tgtEl>
-                                      </p:cBhvr>
-                                    </p:animEffect>
-                                  </p:childTnLst>
-                                </p:cTn>
-                              </p:par>
-                            </p:childTnLst>
-                          </p:cTn>
-                        </p:par>
-                      </p:childTnLst>
-                    </p:cTn>
-                  </p:par>
-                  <p:par>
-                    <p:cTn id="32" fill="hold">
-                      <p:stCondLst>
-                        <p:cond delay="indefinite"/>
-                      </p:stCondLst>
-                      <p:childTnLst>
-                        <p:par>
-                          <p:cTn id="33" fill="hold">
-                            <p:stCondLst>
-                              <p:cond delay="0"/>
-                            </p:stCondLst>
-                            <p:childTnLst>
-                              <p:par>
-                                <p:cTn id="34" presetID="10" presetClass="entr" presetSubtype="0" fill="hold" nodeType="clickEffect">
-                                  <p:stCondLst>
-                                    <p:cond delay="0"/>
-                                  </p:stCondLst>
-                                  <p:childTnLst>
-                                    <p:set>
-                                      <p:cBhvr>
-                                        <p:cTn id="35" dur="1" fill="hold">
-                                          <p:stCondLst>
-                                            <p:cond delay="0"/>
-                                          </p:stCondLst>
-                                        </p:cTn>
-                                        <p:tgtEl>
-                                          <p:spTgt spid="2">
-                                            <p:txEl>
-                                              <p:pRg st="4" end="4"/>
-                                            </p:txEl>
-                                          </p:spTgt>
-                                        </p:tgtEl>
-                                        <p:attrNameLst>
-                                          <p:attrName>style.visibility</p:attrName>
-                                        </p:attrNameLst>
-                                      </p:cBhvr>
-                                      <p:to>
-                                        <p:strVal val="visible"/>
-                                      </p:to>
-                                    </p:set>
-                                    <p:animEffect transition="in" filter="fade">
-                                      <p:cBhvr>
-                                        <p:cTn id="36" dur="500"/>
-                                        <p:tgtEl>
-                                          <p:spTgt spid="2">
-                                            <p:txEl>
-                                              <p:pRg st="4" end="4"/>
-                                            </p:txEl>
-                                          </p:spTgt>
                                         </p:tgtEl>
                                       </p:cBhvr>
                                     </p:animEffect>
@@ -8057,7 +6468,7 @@
         <p:spPr>
           <a:xfrm>
             <a:off x="4572000" y="307186"/>
-            <a:ext cx="4159204" cy="1077218"/>
+            <a:ext cx="4159204" cy="584775"/>
           </a:xfrm>
           <a:prstGeom prst="rect">
             <a:avLst/>
@@ -8080,7 +6491,7 @@
                 </a:solidFill>
                 <a:latin typeface="Soho Std" pitchFamily="18" charset="0"/>
               </a:rPr>
-              <a:t>Too Many Parameters</a:t>
+              <a:t>Text Pipes</a:t>
             </a:r>
             <a:endParaRPr lang="en-US" sz="3200" dirty="0">
               <a:solidFill>
@@ -8095,94 +6506,6 @@
       </p:sp>
       <p:sp>
         <p:nvSpPr>
-          <p:cNvPr id="5" name="TextBox 4"/>
-          <p:cNvSpPr txBox="1"/>
-          <p:nvPr/>
-        </p:nvSpPr>
-        <p:spPr>
-          <a:xfrm>
-            <a:off x="597117" y="4677443"/>
-            <a:ext cx="7661731" cy="1938992"/>
-          </a:xfrm>
-          <a:prstGeom prst="rect">
-            <a:avLst/>
-          </a:prstGeom>
-          <a:noFill/>
-        </p:spPr>
-        <p:txBody>
-          <a:bodyPr wrap="square" rtlCol="0">
-            <a:spAutoFit/>
-          </a:bodyPr>
-          <a:lstStyle/>
-          <a:p>
-            <a:r>
-              <a:rPr lang="en-US" sz="3000" dirty="0" smtClean="0">
-                <a:solidFill>
-                  <a:schemeClr val="tx2">
-                    <a:lumMod val="20000"/>
-                    <a:lumOff val="80000"/>
-                  </a:schemeClr>
-                </a:solidFill>
-                <a:latin typeface="Soho Std" pitchFamily="18" charset="0"/>
-              </a:rPr>
-              <a:t>$param1 = Get-Stuff</a:t>
-            </a:r>
-          </a:p>
-          <a:p>
-            <a:r>
-              <a:rPr lang="en-US" sz="3000" dirty="0" smtClean="0">
-                <a:solidFill>
-                  <a:schemeClr val="tx2">
-                    <a:lumMod val="20000"/>
-                    <a:lumOff val="80000"/>
-                  </a:schemeClr>
-                </a:solidFill>
-                <a:latin typeface="Soho Std" pitchFamily="18" charset="0"/>
-              </a:rPr>
-              <a:t>$param2 = Get-More-Stuff $param1</a:t>
-            </a:r>
-          </a:p>
-          <a:p>
-            <a:r>
-              <a:rPr lang="en-US" sz="3000" dirty="0" smtClean="0">
-                <a:solidFill>
-                  <a:schemeClr val="tx2">
-                    <a:lumMod val="20000"/>
-                    <a:lumOff val="80000"/>
-                  </a:schemeClr>
-                </a:solidFill>
-                <a:latin typeface="Soho Std" pitchFamily="18" charset="0"/>
-              </a:rPr>
-              <a:t>$param3 = Get-Final-Stuff $param2</a:t>
-            </a:r>
-          </a:p>
-          <a:p>
-            <a:r>
-              <a:rPr lang="en-US" sz="3000" dirty="0" smtClean="0">
-                <a:solidFill>
-                  <a:schemeClr val="tx2">
-                    <a:lumMod val="20000"/>
-                    <a:lumOff val="80000"/>
-                  </a:schemeClr>
-                </a:solidFill>
-                <a:latin typeface="Soho Std" pitchFamily="18" charset="0"/>
-              </a:rPr>
-              <a:t>$output = Combine-Stuff $param3</a:t>
-            </a:r>
-            <a:endParaRPr lang="en-US" sz="3000" dirty="0">
-              <a:solidFill>
-                <a:schemeClr val="tx2">
-                  <a:lumMod val="20000"/>
-                  <a:lumOff val="80000"/>
-                </a:schemeClr>
-              </a:solidFill>
-              <a:latin typeface="Soho Std" pitchFamily="18" charset="0"/>
-            </a:endParaRPr>
-          </a:p>
-        </p:txBody>
-      </p:sp>
-      <p:sp>
-        <p:nvSpPr>
           <p:cNvPr id="6" name="Footer Placeholder 5"/>
           <p:cNvSpPr>
             <a:spLocks noGrp="1"/>
@@ -8201,65 +6524,6 @@
               <a:t>github.com/adamclerk/FunWithPowershell2012</a:t>
             </a:r>
             <a:endParaRPr lang="en-US"/>
-          </a:p>
-        </p:txBody>
-      </p:sp>
-      <p:sp>
-        <p:nvSpPr>
-          <p:cNvPr id="7" name="TextBox 6"/>
-          <p:cNvSpPr txBox="1"/>
-          <p:nvPr/>
-        </p:nvSpPr>
-        <p:spPr>
-          <a:xfrm>
-            <a:off x="597117" y="1661403"/>
-            <a:ext cx="7661731" cy="1015663"/>
-          </a:xfrm>
-          <a:prstGeom prst="rect">
-            <a:avLst/>
-          </a:prstGeom>
-          <a:noFill/>
-        </p:spPr>
-        <p:txBody>
-          <a:bodyPr wrap="square" rtlCol="0">
-            <a:spAutoFit/>
-          </a:bodyPr>
-          <a:lstStyle/>
-          <a:p>
-            <a:pPr marL="571500" indent="-571500">
-              <a:buFont typeface="Arial" pitchFamily="34" charset="0"/>
-              <a:buChar char="•"/>
-            </a:pPr>
-            <a:r>
-              <a:rPr lang="en-US" sz="3000" dirty="0" smtClean="0">
-                <a:solidFill>
-                  <a:schemeClr val="tx2">
-                    <a:lumMod val="20000"/>
-                    <a:lumOff val="80000"/>
-                  </a:schemeClr>
-                </a:solidFill>
-                <a:latin typeface="Soho Std" pitchFamily="18" charset="0"/>
-              </a:rPr>
-              <a:t>!Readable</a:t>
-            </a:r>
-          </a:p>
-          <a:p>
-            <a:pPr marL="571500" indent="-571500">
-              <a:buFont typeface="Arial" pitchFamily="34" charset="0"/>
-              <a:buChar char="•"/>
-            </a:pPr>
-            <a:r>
-              <a:rPr lang="en-US" sz="3000" dirty="0" smtClean="0">
-                <a:solidFill>
-                  <a:schemeClr val="tx2">
-                    <a:lumMod val="20000"/>
-                    <a:lumOff val="80000"/>
-                  </a:schemeClr>
-                </a:solidFill>
-                <a:latin typeface="Soho Std" pitchFamily="18" charset="0"/>
-              </a:rPr>
-              <a:t>Messy</a:t>
-            </a:r>
           </a:p>
         </p:txBody>
       </p:sp>
@@ -8381,181 +6645,6 @@
                       </p:childTnLst>
                     </p:cTn>
                   </p:par>
-                  <p:par>
-                    <p:cTn id="12" fill="hold">
-                      <p:stCondLst>
-                        <p:cond delay="indefinite"/>
-                      </p:stCondLst>
-                      <p:childTnLst>
-                        <p:par>
-                          <p:cTn id="13" fill="hold">
-                            <p:stCondLst>
-                              <p:cond delay="0"/>
-                            </p:stCondLst>
-                            <p:childTnLst>
-                              <p:par>
-                                <p:cTn id="14" presetID="10" presetClass="entr" presetSubtype="0" fill="hold" grpId="0" nodeType="clickEffect">
-                                  <p:stCondLst>
-                                    <p:cond delay="0"/>
-                                  </p:stCondLst>
-                                  <p:childTnLst>
-                                    <p:set>
-                                      <p:cBhvr>
-                                        <p:cTn id="15" dur="1" fill="hold">
-                                          <p:stCondLst>
-                                            <p:cond delay="0"/>
-                                          </p:stCondLst>
-                                        </p:cTn>
-                                        <p:tgtEl>
-                                          <p:spTgt spid="5"/>
-                                        </p:tgtEl>
-                                        <p:attrNameLst>
-                                          <p:attrName>style.visibility</p:attrName>
-                                        </p:attrNameLst>
-                                      </p:cBhvr>
-                                      <p:to>
-                                        <p:strVal val="visible"/>
-                                      </p:to>
-                                    </p:set>
-                                    <p:animEffect transition="in" filter="fade">
-                                      <p:cBhvr>
-                                        <p:cTn id="16" dur="500"/>
-                                        <p:tgtEl>
-                                          <p:spTgt spid="5"/>
-                                        </p:tgtEl>
-                                      </p:cBhvr>
-                                    </p:animEffect>
-                                  </p:childTnLst>
-                                </p:cTn>
-                              </p:par>
-                            </p:childTnLst>
-                          </p:cTn>
-                        </p:par>
-                      </p:childTnLst>
-                    </p:cTn>
-                  </p:par>
-                  <p:par>
-                    <p:cTn id="17" fill="hold">
-                      <p:stCondLst>
-                        <p:cond delay="indefinite"/>
-                      </p:stCondLst>
-                      <p:childTnLst>
-                        <p:par>
-                          <p:cTn id="18" fill="hold">
-                            <p:stCondLst>
-                              <p:cond delay="0"/>
-                            </p:stCondLst>
-                            <p:childTnLst>
-                              <p:par>
-                                <p:cTn id="19" presetID="10" presetClass="entr" presetSubtype="0" fill="hold" nodeType="clickEffect">
-                                  <p:stCondLst>
-                                    <p:cond delay="0"/>
-                                  </p:stCondLst>
-                                  <p:childTnLst>
-                                    <p:set>
-                                      <p:cBhvr>
-                                        <p:cTn id="20" dur="1" fill="hold">
-                                          <p:stCondLst>
-                                            <p:cond delay="0"/>
-                                          </p:stCondLst>
-                                        </p:cTn>
-                                        <p:tgtEl>
-                                          <p:spTgt spid="7">
-                                            <p:txEl>
-                                              <p:pRg st="0" end="0"/>
-                                            </p:txEl>
-                                          </p:spTgt>
-                                        </p:tgtEl>
-                                        <p:attrNameLst>
-                                          <p:attrName>style.visibility</p:attrName>
-                                        </p:attrNameLst>
-                                      </p:cBhvr>
-                                      <p:to>
-                                        <p:strVal val="visible"/>
-                                      </p:to>
-                                    </p:set>
-                                    <p:animEffect transition="in" filter="fade">
-                                      <p:cBhvr>
-                                        <p:cTn id="21" dur="500"/>
-                                        <p:tgtEl>
-                                          <p:spTgt spid="7">
-                                            <p:txEl>
-                                              <p:pRg st="0" end="0"/>
-                                            </p:txEl>
-                                          </p:spTgt>
-                                        </p:tgtEl>
-                                      </p:cBhvr>
-                                    </p:animEffect>
-                                  </p:childTnLst>
-                                </p:cTn>
-                              </p:par>
-                            </p:childTnLst>
-                          </p:cTn>
-                        </p:par>
-                      </p:childTnLst>
-                    </p:cTn>
-                  </p:par>
-                  <p:par>
-                    <p:cTn id="22" fill="hold">
-                      <p:stCondLst>
-                        <p:cond delay="indefinite"/>
-                      </p:stCondLst>
-                      <p:childTnLst>
-                        <p:par>
-                          <p:cTn id="23" fill="hold">
-                            <p:stCondLst>
-                              <p:cond delay="0"/>
-                            </p:stCondLst>
-                            <p:childTnLst>
-                              <p:par>
-                                <p:cTn id="24" presetID="10" presetClass="entr" presetSubtype="0" fill="hold" nodeType="clickEffect">
-                                  <p:stCondLst>
-                                    <p:cond delay="0"/>
-                                  </p:stCondLst>
-                                  <p:childTnLst>
-                                    <p:set>
-                                      <p:cBhvr>
-                                        <p:cTn id="25" dur="1" fill="hold">
-                                          <p:stCondLst>
-                                            <p:cond delay="0"/>
-                                          </p:stCondLst>
-                                        </p:cTn>
-                                        <p:tgtEl>
-                                          <p:spTgt spid="7">
-                                            <p:txEl>
-                                              <p:pRg st="1" end="1"/>
-                                            </p:txEl>
-                                          </p:spTgt>
-                                        </p:tgtEl>
-                                        <p:attrNameLst>
-                                          <p:attrName>style.visibility</p:attrName>
-                                        </p:attrNameLst>
-                                      </p:cBhvr>
-                                      <p:to>
-                                        <p:strVal val="visible"/>
-                                      </p:to>
-                                    </p:set>
-                                    <p:animEffect transition="in" filter="fade">
-                                      <p:cBhvr>
-                                        <p:cTn id="26" dur="500"/>
-                                        <p:tgtEl>
-                                          <p:spTgt spid="7">
-                                            <p:txEl>
-                                              <p:pRg st="1" end="1"/>
-                                            </p:txEl>
-                                          </p:spTgt>
-                                        </p:tgtEl>
-                                      </p:cBhvr>
-                                    </p:animEffect>
-                                  </p:childTnLst>
-                                </p:cTn>
-                              </p:par>
-                            </p:childTnLst>
-                          </p:cTn>
-                        </p:par>
-                      </p:childTnLst>
-                    </p:cTn>
-                  </p:par>
                 </p:childTnLst>
               </p:cTn>
               <p:prevCondLst>
@@ -8580,7 +6669,6 @@
     <p:bldLst>
       <p:bldP spid="2" grpId="0"/>
       <p:bldP spid="4" grpId="0"/>
-      <p:bldP spid="5" grpId="0"/>
     </p:bldLst>
   </p:timing>
 </p:sld>
@@ -8675,7 +6763,7 @@
                 </a:solidFill>
                 <a:latin typeface="Soho Std" pitchFamily="18" charset="0"/>
               </a:rPr>
-              <a:t>Pipes</a:t>
+              <a:t>Object Pipes</a:t>
             </a:r>
             <a:endParaRPr lang="en-US" sz="3200" dirty="0">
               <a:solidFill>
@@ -8690,94 +6778,6 @@
       </p:sp>
       <p:sp>
         <p:nvSpPr>
-          <p:cNvPr id="5" name="TextBox 4"/>
-          <p:cNvSpPr txBox="1"/>
-          <p:nvPr/>
-        </p:nvSpPr>
-        <p:spPr>
-          <a:xfrm>
-            <a:off x="597117" y="4667918"/>
-            <a:ext cx="7661731" cy="1938992"/>
-          </a:xfrm>
-          <a:prstGeom prst="rect">
-            <a:avLst/>
-          </a:prstGeom>
-          <a:noFill/>
-        </p:spPr>
-        <p:txBody>
-          <a:bodyPr wrap="square" rtlCol="0">
-            <a:spAutoFit/>
-          </a:bodyPr>
-          <a:lstStyle/>
-          <a:p>
-            <a:r>
-              <a:rPr lang="en-US" sz="3000" dirty="0" smtClean="0">
-                <a:solidFill>
-                  <a:schemeClr val="tx2">
-                    <a:lumMod val="20000"/>
-                    <a:lumOff val="80000"/>
-                  </a:schemeClr>
-                </a:solidFill>
-                <a:latin typeface="Soho Std" pitchFamily="18" charset="0"/>
-              </a:rPr>
-              <a:t>Get-Stuff | </a:t>
-            </a:r>
-          </a:p>
-          <a:p>
-            <a:r>
-              <a:rPr lang="en-US" sz="3000" dirty="0" smtClean="0">
-                <a:solidFill>
-                  <a:schemeClr val="tx2">
-                    <a:lumMod val="20000"/>
-                    <a:lumOff val="80000"/>
-                  </a:schemeClr>
-                </a:solidFill>
-                <a:latin typeface="Soho Std" pitchFamily="18" charset="0"/>
-              </a:rPr>
-              <a:t>Get-More-Stuff |</a:t>
-            </a:r>
-          </a:p>
-          <a:p>
-            <a:r>
-              <a:rPr lang="en-US" sz="3000" dirty="0" smtClean="0">
-                <a:solidFill>
-                  <a:schemeClr val="tx2">
-                    <a:lumMod val="20000"/>
-                    <a:lumOff val="80000"/>
-                  </a:schemeClr>
-                </a:solidFill>
-                <a:latin typeface="Soho Std" pitchFamily="18" charset="0"/>
-              </a:rPr>
-              <a:t>Get-Final-Stuff |</a:t>
-            </a:r>
-          </a:p>
-          <a:p>
-            <a:r>
-              <a:rPr lang="en-US" sz="3000" dirty="0" smtClean="0">
-                <a:solidFill>
-                  <a:schemeClr val="tx2">
-                    <a:lumMod val="20000"/>
-                    <a:lumOff val="80000"/>
-                  </a:schemeClr>
-                </a:solidFill>
-                <a:latin typeface="Soho Std" pitchFamily="18" charset="0"/>
-              </a:rPr>
-              <a:t>Combine-Stuff</a:t>
-            </a:r>
-            <a:endParaRPr lang="en-US" sz="3000" dirty="0">
-              <a:solidFill>
-                <a:schemeClr val="tx2">
-                  <a:lumMod val="20000"/>
-                  <a:lumOff val="80000"/>
-                </a:schemeClr>
-              </a:solidFill>
-              <a:latin typeface="Soho Std" pitchFamily="18" charset="0"/>
-            </a:endParaRPr>
-          </a:p>
-        </p:txBody>
-      </p:sp>
-      <p:sp>
-        <p:nvSpPr>
           <p:cNvPr id="6" name="Footer Placeholder 5"/>
           <p:cNvSpPr>
             <a:spLocks noGrp="1"/>
@@ -8796,98 +6796,6 @@
               <a:t>github.com/adamclerk/FunWithPowershell2012</a:t>
             </a:r>
             <a:endParaRPr lang="en-US"/>
-          </a:p>
-        </p:txBody>
-      </p:sp>
-      <p:sp>
-        <p:nvSpPr>
-          <p:cNvPr id="7" name="TextBox 6"/>
-          <p:cNvSpPr txBox="1"/>
-          <p:nvPr/>
-        </p:nvSpPr>
-        <p:spPr>
-          <a:xfrm>
-            <a:off x="597117" y="1661403"/>
-            <a:ext cx="7661731" cy="1938992"/>
-          </a:xfrm>
-          <a:prstGeom prst="rect">
-            <a:avLst/>
-          </a:prstGeom>
-          <a:noFill/>
-        </p:spPr>
-        <p:txBody>
-          <a:bodyPr wrap="square" rtlCol="0">
-            <a:spAutoFit/>
-          </a:bodyPr>
-          <a:lstStyle/>
-          <a:p>
-            <a:pPr marL="571500" indent="-571500">
-              <a:buFont typeface="Arial" pitchFamily="34" charset="0"/>
-              <a:buChar char="•"/>
-            </a:pPr>
-            <a:r>
-              <a:rPr lang="en-US" sz="3000" dirty="0" smtClean="0">
-                <a:solidFill>
-                  <a:schemeClr val="tx2">
-                    <a:lumMod val="20000"/>
-                    <a:lumOff val="80000"/>
-                  </a:schemeClr>
-                </a:solidFill>
-                <a:latin typeface="Soho Std" pitchFamily="18" charset="0"/>
-              </a:rPr>
-              <a:t>Object Pipes</a:t>
-            </a:r>
-          </a:p>
-          <a:p>
-            <a:pPr marL="571500" indent="-571500">
-              <a:buFont typeface="Arial" pitchFamily="34" charset="0"/>
-              <a:buChar char="•"/>
-            </a:pPr>
-            <a:r>
-              <a:rPr lang="en-US" sz="3000" dirty="0" smtClean="0">
-                <a:solidFill>
-                  <a:schemeClr val="tx2">
-                    <a:lumMod val="20000"/>
-                    <a:lumOff val="80000"/>
-                  </a:schemeClr>
-                </a:solidFill>
-                <a:latin typeface="Soho Std" pitchFamily="18" charset="0"/>
-              </a:rPr>
-              <a:t>!Text Pipes</a:t>
-            </a:r>
-          </a:p>
-          <a:p>
-            <a:pPr marL="571500" indent="-571500">
-              <a:buFont typeface="Arial" pitchFamily="34" charset="0"/>
-              <a:buChar char="•"/>
-            </a:pPr>
-            <a:r>
-              <a:rPr lang="en-US" sz="3000" dirty="0" smtClean="0">
-                <a:solidFill>
-                  <a:schemeClr val="tx2">
-                    <a:lumMod val="20000"/>
-                    <a:lumOff val="80000"/>
-                  </a:schemeClr>
-                </a:solidFill>
-                <a:latin typeface="Soho Std" pitchFamily="18" charset="0"/>
-              </a:rPr>
-              <a:t>Readable</a:t>
-            </a:r>
-          </a:p>
-          <a:p>
-            <a:pPr marL="571500" indent="-571500">
-              <a:buFont typeface="Arial" pitchFamily="34" charset="0"/>
-              <a:buChar char="•"/>
-            </a:pPr>
-            <a:endParaRPr lang="en-US" sz="3000" dirty="0" smtClean="0">
-              <a:solidFill>
-                <a:schemeClr val="tx2">
-                  <a:lumMod val="20000"/>
-                  <a:lumOff val="80000"/>
-                </a:schemeClr>
-              </a:solidFill>
-              <a:latin typeface="Soho Std" pitchFamily="18" charset="0"/>
-            </a:endParaRPr>
           </a:p>
         </p:txBody>
       </p:sp>
@@ -9009,242 +6917,6 @@
                       </p:childTnLst>
                     </p:cTn>
                   </p:par>
-                  <p:par>
-                    <p:cTn id="12" fill="hold">
-                      <p:stCondLst>
-                        <p:cond delay="indefinite"/>
-                      </p:stCondLst>
-                      <p:childTnLst>
-                        <p:par>
-                          <p:cTn id="13" fill="hold">
-                            <p:stCondLst>
-                              <p:cond delay="0"/>
-                            </p:stCondLst>
-                            <p:childTnLst>
-                              <p:par>
-                                <p:cTn id="14" presetID="10" presetClass="entr" presetSubtype="0" fill="hold" grpId="0" nodeType="clickEffect">
-                                  <p:stCondLst>
-                                    <p:cond delay="0"/>
-                                  </p:stCondLst>
-                                  <p:childTnLst>
-                                    <p:set>
-                                      <p:cBhvr>
-                                        <p:cTn id="15" dur="1" fill="hold">
-                                          <p:stCondLst>
-                                            <p:cond delay="0"/>
-                                          </p:stCondLst>
-                                        </p:cTn>
-                                        <p:tgtEl>
-                                          <p:spTgt spid="5"/>
-                                        </p:tgtEl>
-                                        <p:attrNameLst>
-                                          <p:attrName>style.visibility</p:attrName>
-                                        </p:attrNameLst>
-                                      </p:cBhvr>
-                                      <p:to>
-                                        <p:strVal val="visible"/>
-                                      </p:to>
-                                    </p:set>
-                                    <p:animEffect transition="in" filter="fade">
-                                      <p:cBhvr>
-                                        <p:cTn id="16" dur="500"/>
-                                        <p:tgtEl>
-                                          <p:spTgt spid="5"/>
-                                        </p:tgtEl>
-                                      </p:cBhvr>
-                                    </p:animEffect>
-                                  </p:childTnLst>
-                                </p:cTn>
-                              </p:par>
-                            </p:childTnLst>
-                          </p:cTn>
-                        </p:par>
-                      </p:childTnLst>
-                    </p:cTn>
-                  </p:par>
-                  <p:par>
-                    <p:cTn id="17" fill="hold">
-                      <p:stCondLst>
-                        <p:cond delay="indefinite"/>
-                      </p:stCondLst>
-                      <p:childTnLst>
-                        <p:par>
-                          <p:cTn id="18" fill="hold">
-                            <p:stCondLst>
-                              <p:cond delay="0"/>
-                            </p:stCondLst>
-                            <p:childTnLst>
-                              <p:par>
-                                <p:cTn id="19" presetID="10" presetClass="entr" presetSubtype="0" fill="hold" nodeType="clickEffect">
-                                  <p:stCondLst>
-                                    <p:cond delay="0"/>
-                                  </p:stCondLst>
-                                  <p:childTnLst>
-                                    <p:set>
-                                      <p:cBhvr>
-                                        <p:cTn id="20" dur="1" fill="hold">
-                                          <p:stCondLst>
-                                            <p:cond delay="0"/>
-                                          </p:stCondLst>
-                                        </p:cTn>
-                                        <p:tgtEl>
-                                          <p:spTgt spid="7">
-                                            <p:txEl>
-                                              <p:pRg st="0" end="0"/>
-                                            </p:txEl>
-                                          </p:spTgt>
-                                        </p:tgtEl>
-                                        <p:attrNameLst>
-                                          <p:attrName>style.visibility</p:attrName>
-                                        </p:attrNameLst>
-                                      </p:cBhvr>
-                                      <p:to>
-                                        <p:strVal val="visible"/>
-                                      </p:to>
-                                    </p:set>
-                                    <p:animEffect transition="in" filter="fade">
-                                      <p:cBhvr>
-                                        <p:cTn id="21" dur="500"/>
-                                        <p:tgtEl>
-                                          <p:spTgt spid="7">
-                                            <p:txEl>
-                                              <p:pRg st="0" end="0"/>
-                                            </p:txEl>
-                                          </p:spTgt>
-                                        </p:tgtEl>
-                                      </p:cBhvr>
-                                    </p:animEffect>
-                                  </p:childTnLst>
-                                </p:cTn>
-                              </p:par>
-                            </p:childTnLst>
-                          </p:cTn>
-                        </p:par>
-                      </p:childTnLst>
-                    </p:cTn>
-                  </p:par>
-                  <p:par>
-                    <p:cTn id="22" fill="hold">
-                      <p:stCondLst>
-                        <p:cond delay="indefinite"/>
-                      </p:stCondLst>
-                      <p:childTnLst>
-                        <p:par>
-                          <p:cTn id="23" fill="hold">
-                            <p:stCondLst>
-                              <p:cond delay="0"/>
-                            </p:stCondLst>
-                            <p:childTnLst>
-                              <p:par>
-                                <p:cTn id="24" presetID="10" presetClass="entr" presetSubtype="0" fill="hold" nodeType="clickEffect">
-                                  <p:stCondLst>
-                                    <p:cond delay="0"/>
-                                  </p:stCondLst>
-                                  <p:childTnLst>
-                                    <p:set>
-                                      <p:cBhvr>
-                                        <p:cTn id="25" dur="1" fill="hold">
-                                          <p:stCondLst>
-                                            <p:cond delay="0"/>
-                                          </p:stCondLst>
-                                        </p:cTn>
-                                        <p:tgtEl>
-                                          <p:spTgt spid="7">
-                                            <p:txEl>
-                                              <p:pRg st="1" end="1"/>
-                                            </p:txEl>
-                                          </p:spTgt>
-                                        </p:tgtEl>
-                                        <p:attrNameLst>
-                                          <p:attrName>style.visibility</p:attrName>
-                                        </p:attrNameLst>
-                                      </p:cBhvr>
-                                      <p:to>
-                                        <p:strVal val="visible"/>
-                                      </p:to>
-                                    </p:set>
-                                    <p:animEffect transition="in" filter="fade">
-                                      <p:cBhvr>
-                                        <p:cTn id="26" dur="500"/>
-                                        <p:tgtEl>
-                                          <p:spTgt spid="7">
-                                            <p:txEl>
-                                              <p:pRg st="1" end="1"/>
-                                            </p:txEl>
-                                          </p:spTgt>
-                                        </p:tgtEl>
-                                      </p:cBhvr>
-                                    </p:animEffect>
-                                  </p:childTnLst>
-                                </p:cTn>
-                              </p:par>
-                            </p:childTnLst>
-                          </p:cTn>
-                        </p:par>
-                      </p:childTnLst>
-                    </p:cTn>
-                  </p:par>
-                  <p:par>
-                    <p:cTn id="27" fill="hold">
-                      <p:stCondLst>
-                        <p:cond delay="indefinite"/>
-                      </p:stCondLst>
-                      <p:childTnLst>
-                        <p:par>
-                          <p:cTn id="28" fill="hold">
-                            <p:stCondLst>
-                              <p:cond delay="0"/>
-                            </p:stCondLst>
-                            <p:childTnLst>
-                              <p:par>
-                                <p:cTn id="29" presetID="10" presetClass="entr" presetSubtype="0" fill="hold" nodeType="clickEffect">
-                                  <p:stCondLst>
-                                    <p:cond delay="0"/>
-                                  </p:stCondLst>
-                                  <p:childTnLst>
-                                    <p:set>
-                                      <p:cBhvr>
-                                        <p:cTn id="30" dur="1" fill="hold">
-                                          <p:stCondLst>
-                                            <p:cond delay="0"/>
-                                          </p:stCondLst>
-                                        </p:cTn>
-                                        <p:tgtEl>
-                                          <p:spTgt spid="7">
-                                            <p:txEl>
-                                              <p:pRg st="2" end="2"/>
-                                            </p:txEl>
-                                          </p:spTgt>
-                                        </p:tgtEl>
-                                        <p:attrNameLst>
-                                          <p:attrName>style.visibility</p:attrName>
-                                        </p:attrNameLst>
-                                      </p:cBhvr>
-                                      <p:to>
-                                        <p:strVal val="visible"/>
-                                      </p:to>
-                                    </p:set>
-                                    <p:animEffect transition="in" filter="fade">
-                                      <p:cBhvr>
-                                        <p:cTn id="31" dur="500"/>
-                                        <p:tgtEl>
-                                          <p:spTgt spid="7">
-                                            <p:txEl>
-                                              <p:pRg st="2" end="2"/>
-                                            </p:txEl>
-                                          </p:spTgt>
-                                        </p:tgtEl>
-                                      </p:cBhvr>
-                                    </p:animEffect>
-                                  </p:childTnLst>
-                                </p:cTn>
-                              </p:par>
-                            </p:childTnLst>
-                          </p:cTn>
-                        </p:par>
-                      </p:childTnLst>
-                    </p:cTn>
-                  </p:par>
                 </p:childTnLst>
               </p:cTn>
               <p:prevCondLst>
@@ -9269,7 +6941,6 @@
     <p:bldLst>
       <p:bldP spid="4" grpId="0"/>
       <p:bldP spid="3" grpId="0"/>
-      <p:bldP spid="5" grpId="0"/>
     </p:bldLst>
   </p:timing>
 </p:sld>
@@ -9645,110 +7316,6 @@
       </p:sp>
       <p:sp>
         <p:nvSpPr>
-          <p:cNvPr id="6" name="TextBox 5"/>
-          <p:cNvSpPr txBox="1"/>
-          <p:nvPr/>
-        </p:nvSpPr>
-        <p:spPr>
-          <a:xfrm>
-            <a:off x="597117" y="1661403"/>
-            <a:ext cx="7661731" cy="1938992"/>
-          </a:xfrm>
-          <a:prstGeom prst="rect">
-            <a:avLst/>
-          </a:prstGeom>
-          <a:noFill/>
-        </p:spPr>
-        <p:txBody>
-          <a:bodyPr wrap="square" rtlCol="0">
-            <a:spAutoFit/>
-          </a:bodyPr>
-          <a:lstStyle/>
-          <a:p>
-            <a:pPr marL="571500" indent="-571500">
-              <a:buFont typeface="Arial" pitchFamily="34" charset="0"/>
-              <a:buChar char="•"/>
-            </a:pPr>
-            <a:r>
-              <a:rPr lang="en-US" sz="3000" dirty="0" smtClean="0">
-                <a:solidFill>
-                  <a:schemeClr val="tx2">
-                    <a:lumMod val="20000"/>
-                    <a:lumOff val="80000"/>
-                  </a:schemeClr>
-                </a:solidFill>
-                <a:latin typeface="Soho Std" pitchFamily="18" charset="0"/>
-              </a:rPr>
-              <a:t>Plain Text</a:t>
-            </a:r>
-          </a:p>
-          <a:p>
-            <a:pPr marL="571500" indent="-571500">
-              <a:buFont typeface="Arial" pitchFamily="34" charset="0"/>
-              <a:buChar char="•"/>
-            </a:pPr>
-            <a:r>
-              <a:rPr lang="en-US" sz="3000" dirty="0" smtClean="0">
-                <a:solidFill>
-                  <a:schemeClr val="tx2">
-                    <a:lumMod val="20000"/>
-                    <a:lumOff val="80000"/>
-                  </a:schemeClr>
-                </a:solidFill>
-                <a:latin typeface="Soho Std" pitchFamily="18" charset="0"/>
-              </a:rPr>
-              <a:t>Typing @ Command Prompt</a:t>
-            </a:r>
-          </a:p>
-          <a:p>
-            <a:pPr marL="571500" indent="-571500">
-              <a:buFont typeface="Arial" pitchFamily="34" charset="0"/>
-              <a:buChar char="•"/>
-            </a:pPr>
-            <a:r>
-              <a:rPr lang="en-US" sz="3000" dirty="0" smtClean="0">
-                <a:solidFill>
-                  <a:schemeClr val="tx2">
-                    <a:lumMod val="20000"/>
-                    <a:lumOff val="80000"/>
-                  </a:schemeClr>
-                </a:solidFill>
-                <a:latin typeface="Soho Std" pitchFamily="18" charset="0"/>
-              </a:rPr>
-              <a:t>Not automated</a:t>
-            </a:r>
-            <a:endParaRPr lang="en-US" sz="3000" dirty="0">
-              <a:solidFill>
-                <a:schemeClr val="tx2">
-                  <a:lumMod val="20000"/>
-                  <a:lumOff val="80000"/>
-                </a:schemeClr>
-              </a:solidFill>
-              <a:latin typeface="Soho Std" pitchFamily="18" charset="0"/>
-            </a:endParaRPr>
-          </a:p>
-          <a:p>
-            <a:pPr marL="571500" indent="-571500">
-              <a:buFont typeface="Arial" pitchFamily="34" charset="0"/>
-              <a:buChar char="•"/>
-            </a:pPr>
-            <a:r>
-              <a:rPr lang="en-US" sz="3000" dirty="0" smtClean="0">
-                <a:solidFill>
-                  <a:schemeClr val="tx2">
-                    <a:lumMod val="20000"/>
-                    <a:lumOff val="80000"/>
-                  </a:schemeClr>
-                </a:solidFill>
-                <a:latin typeface="Soho Std" pitchFamily="18" charset="0"/>
-              </a:rPr>
-              <a:t>Not secure</a:t>
-            </a:r>
-          </a:p>
-        </p:txBody>
-      </p:sp>
-      <p:sp>
-        <p:nvSpPr>
           <p:cNvPr id="3" name="Footer Placeholder 2"/>
           <p:cNvSpPr>
             <a:spLocks noGrp="1"/>
@@ -9879,250 +7446,6 @@
                       </p:childTnLst>
                     </p:cTn>
                   </p:par>
-                  <p:par>
-                    <p:cTn id="11" fill="hold">
-                      <p:stCondLst>
-                        <p:cond delay="indefinite"/>
-                      </p:stCondLst>
-                      <p:childTnLst>
-                        <p:par>
-                          <p:cTn id="12" fill="hold">
-                            <p:stCondLst>
-                              <p:cond delay="0"/>
-                            </p:stCondLst>
-                            <p:childTnLst>
-                              <p:par>
-                                <p:cTn id="13" presetID="10" presetClass="entr" presetSubtype="0" fill="hold" nodeType="clickEffect">
-                                  <p:stCondLst>
-                                    <p:cond delay="0"/>
-                                  </p:stCondLst>
-                                  <p:childTnLst>
-                                    <p:set>
-                                      <p:cBhvr>
-                                        <p:cTn id="14" dur="1" fill="hold">
-                                          <p:stCondLst>
-                                            <p:cond delay="0"/>
-                                          </p:stCondLst>
-                                        </p:cTn>
-                                        <p:tgtEl>
-                                          <p:spTgt spid="6">
-                                            <p:txEl>
-                                              <p:pRg st="0" end="0"/>
-                                            </p:txEl>
-                                          </p:spTgt>
-                                        </p:tgtEl>
-                                        <p:attrNameLst>
-                                          <p:attrName>style.visibility</p:attrName>
-                                        </p:attrNameLst>
-                                      </p:cBhvr>
-                                      <p:to>
-                                        <p:strVal val="visible"/>
-                                      </p:to>
-                                    </p:set>
-                                    <p:animEffect transition="in" filter="fade">
-                                      <p:cBhvr>
-                                        <p:cTn id="15" dur="500"/>
-                                        <p:tgtEl>
-                                          <p:spTgt spid="6">
-                                            <p:txEl>
-                                              <p:pRg st="0" end="0"/>
-                                            </p:txEl>
-                                          </p:spTgt>
-                                        </p:tgtEl>
-                                      </p:cBhvr>
-                                    </p:animEffect>
-                                  </p:childTnLst>
-                                </p:cTn>
-                              </p:par>
-                            </p:childTnLst>
-                          </p:cTn>
-                        </p:par>
-                      </p:childTnLst>
-                    </p:cTn>
-                  </p:par>
-                  <p:par>
-                    <p:cTn id="16" fill="hold">
-                      <p:stCondLst>
-                        <p:cond delay="indefinite"/>
-                      </p:stCondLst>
-                      <p:childTnLst>
-                        <p:par>
-                          <p:cTn id="17" fill="hold">
-                            <p:stCondLst>
-                              <p:cond delay="0"/>
-                            </p:stCondLst>
-                            <p:childTnLst>
-                              <p:par>
-                                <p:cTn id="18" presetID="10" presetClass="entr" presetSubtype="0" fill="hold" nodeType="clickEffect">
-                                  <p:stCondLst>
-                                    <p:cond delay="0"/>
-                                  </p:stCondLst>
-                                  <p:childTnLst>
-                                    <p:set>
-                                      <p:cBhvr>
-                                        <p:cTn id="19" dur="1" fill="hold">
-                                          <p:stCondLst>
-                                            <p:cond delay="0"/>
-                                          </p:stCondLst>
-                                        </p:cTn>
-                                        <p:tgtEl>
-                                          <p:spTgt spid="6">
-                                            <p:txEl>
-                                              <p:pRg st="1" end="1"/>
-                                            </p:txEl>
-                                          </p:spTgt>
-                                        </p:tgtEl>
-                                        <p:attrNameLst>
-                                          <p:attrName>style.visibility</p:attrName>
-                                        </p:attrNameLst>
-                                      </p:cBhvr>
-                                      <p:to>
-                                        <p:strVal val="visible"/>
-                                      </p:to>
-                                    </p:set>
-                                    <p:animEffect transition="in" filter="fade">
-                                      <p:cBhvr>
-                                        <p:cTn id="20" dur="500"/>
-                                        <p:tgtEl>
-                                          <p:spTgt spid="6">
-                                            <p:txEl>
-                                              <p:pRg st="1" end="1"/>
-                                            </p:txEl>
-                                          </p:spTgt>
-                                        </p:tgtEl>
-                                      </p:cBhvr>
-                                    </p:animEffect>
-                                  </p:childTnLst>
-                                </p:cTn>
-                              </p:par>
-                            </p:childTnLst>
-                          </p:cTn>
-                        </p:par>
-                      </p:childTnLst>
-                    </p:cTn>
-                  </p:par>
-                  <p:par>
-                    <p:cTn id="21" fill="hold">
-                      <p:stCondLst>
-                        <p:cond delay="indefinite"/>
-                      </p:stCondLst>
-                      <p:childTnLst>
-                        <p:par>
-                          <p:cTn id="22" fill="hold">
-                            <p:stCondLst>
-                              <p:cond delay="0"/>
-                            </p:stCondLst>
-                            <p:childTnLst>
-                              <p:par>
-                                <p:cTn id="23" presetID="10" presetClass="entr" presetSubtype="0" fill="hold" nodeType="clickEffect">
-                                  <p:stCondLst>
-                                    <p:cond delay="0"/>
-                                  </p:stCondLst>
-                                  <p:childTnLst>
-                                    <p:set>
-                                      <p:cBhvr>
-                                        <p:cTn id="24" dur="1" fill="hold">
-                                          <p:stCondLst>
-                                            <p:cond delay="0"/>
-                                          </p:stCondLst>
-                                        </p:cTn>
-                                        <p:tgtEl>
-                                          <p:spTgt spid="6">
-                                            <p:txEl>
-                                              <p:pRg st="2" end="2"/>
-                                            </p:txEl>
-                                          </p:spTgt>
-                                        </p:tgtEl>
-                                        <p:attrNameLst>
-                                          <p:attrName>style.visibility</p:attrName>
-                                        </p:attrNameLst>
-                                      </p:cBhvr>
-                                      <p:to>
-                                        <p:strVal val="visible"/>
-                                      </p:to>
-                                    </p:set>
-                                    <p:animEffect transition="in" filter="fade">
-                                      <p:cBhvr>
-                                        <p:cTn id="25" dur="500"/>
-                                        <p:tgtEl>
-                                          <p:spTgt spid="6">
-                                            <p:txEl>
-                                              <p:pRg st="2" end="2"/>
-                                            </p:txEl>
-                                          </p:spTgt>
-                                        </p:tgtEl>
-                                      </p:cBhvr>
-                                    </p:animEffect>
-                                  </p:childTnLst>
-                                </p:cTn>
-                              </p:par>
-                            </p:childTnLst>
-                          </p:cTn>
-                        </p:par>
-                      </p:childTnLst>
-                    </p:cTn>
-                  </p:par>
-                  <p:par>
-                    <p:cTn id="26" fill="hold">
-                      <p:stCondLst>
-                        <p:cond delay="indefinite"/>
-                      </p:stCondLst>
-                      <p:childTnLst>
-                        <p:par>
-                          <p:cTn id="27" fill="hold">
-                            <p:stCondLst>
-                              <p:cond delay="0"/>
-                            </p:stCondLst>
-                            <p:childTnLst>
-                              <p:par>
-                                <p:cTn id="28" presetID="10" presetClass="entr" presetSubtype="0" fill="hold" nodeType="clickEffect">
-                                  <p:stCondLst>
-                                    <p:cond delay="0"/>
-                                  </p:stCondLst>
-                                  <p:childTnLst>
-                                    <p:set>
-                                      <p:cBhvr>
-                                        <p:cTn id="29" dur="1" fill="hold">
-                                          <p:stCondLst>
-                                            <p:cond delay="0"/>
-                                          </p:stCondLst>
-                                        </p:cTn>
-                                        <p:tgtEl>
-                                          <p:spTgt spid="6">
-                                            <p:txEl>
-                                              <p:pRg st="3" end="3"/>
-                                            </p:txEl>
-                                          </p:spTgt>
-                                        </p:tgtEl>
-                                        <p:attrNameLst>
-                                          <p:attrName>style.visibility</p:attrName>
-                                        </p:attrNameLst>
-                                      </p:cBhvr>
-                                      <p:to>
-                                        <p:strVal val="visible"/>
-                                      </p:to>
-                                    </p:set>
-                                    <p:animEffect transition="in" filter="fade">
-                                      <p:cBhvr>
-                                        <p:cTn id="30" dur="500"/>
-                                        <p:tgtEl>
-                                          <p:spTgt spid="6">
-                                            <p:txEl>
-                                              <p:pRg st="3" end="3"/>
-                                            </p:txEl>
-                                          </p:spTgt>
-                                        </p:tgtEl>
-                                      </p:cBhvr>
-                                    </p:animEffect>
-                                  </p:childTnLst>
-                                </p:cTn>
-                              </p:par>
-                            </p:childTnLst>
-                          </p:cTn>
-                        </p:par>
-                      </p:childTnLst>
-                    </p:cTn>
-                  </p:par>
                 </p:childTnLst>
               </p:cTn>
               <p:prevCondLst>
@@ -10265,92 +7588,6 @@
               </a:solidFill>
               <a:latin typeface="Soho Std" pitchFamily="18" charset="0"/>
             </a:endParaRPr>
-          </a:p>
-        </p:txBody>
-      </p:sp>
-      <p:sp>
-        <p:nvSpPr>
-          <p:cNvPr id="6" name="TextBox 5"/>
-          <p:cNvSpPr txBox="1"/>
-          <p:nvPr/>
-        </p:nvSpPr>
-        <p:spPr>
-          <a:xfrm>
-            <a:off x="597117" y="1661403"/>
-            <a:ext cx="7661731" cy="2400657"/>
-          </a:xfrm>
-          <a:prstGeom prst="rect">
-            <a:avLst/>
-          </a:prstGeom>
-          <a:noFill/>
-        </p:spPr>
-        <p:txBody>
-          <a:bodyPr wrap="square" rtlCol="0">
-            <a:spAutoFit/>
-          </a:bodyPr>
-          <a:lstStyle/>
-          <a:p>
-            <a:pPr marL="571500" indent="-571500">
-              <a:buFont typeface="Arial" pitchFamily="34" charset="0"/>
-              <a:buChar char="•"/>
-            </a:pPr>
-            <a:r>
-              <a:rPr lang="en-US" sz="3000" dirty="0" smtClean="0">
-                <a:latin typeface="Soho Std" pitchFamily="18" charset="0"/>
-              </a:rPr>
-              <a:t>Encrypted</a:t>
-            </a:r>
-          </a:p>
-          <a:p>
-            <a:pPr marL="571500" indent="-571500">
-              <a:buFont typeface="Arial" pitchFamily="34" charset="0"/>
-              <a:buChar char="•"/>
-            </a:pPr>
-            <a:r>
-              <a:rPr lang="en-US" sz="3000" dirty="0" smtClean="0">
-                <a:latin typeface="Soho Std" pitchFamily="18" charset="0"/>
-              </a:rPr>
-              <a:t>Retrievable</a:t>
-            </a:r>
-          </a:p>
-          <a:p>
-            <a:pPr marL="571500" indent="-571500">
-              <a:buFont typeface="Arial" pitchFamily="34" charset="0"/>
-              <a:buChar char="•"/>
-            </a:pPr>
-            <a:r>
-              <a:rPr lang="en-US" sz="3000" dirty="0" smtClean="0">
-                <a:latin typeface="Soho Std" pitchFamily="18" charset="0"/>
-              </a:rPr>
-              <a:t>Automated</a:t>
-            </a:r>
-            <a:endParaRPr lang="en-US" sz="3000" dirty="0">
-              <a:latin typeface="Soho Std" pitchFamily="18" charset="0"/>
-            </a:endParaRPr>
-          </a:p>
-          <a:p>
-            <a:pPr marL="571500" indent="-571500">
-              <a:buFont typeface="Arial" pitchFamily="34" charset="0"/>
-              <a:buChar char="•"/>
-            </a:pPr>
-            <a:r>
-              <a:rPr lang="en-US" sz="3000" dirty="0" smtClean="0">
-                <a:latin typeface="Soho Std" pitchFamily="18" charset="0"/>
-              </a:rPr>
-              <a:t>Slightly more secure than Plain Text</a:t>
-            </a:r>
-          </a:p>
-          <a:p>
-            <a:pPr marL="571500" indent="-571500">
-              <a:buFont typeface="Arial" pitchFamily="34" charset="0"/>
-              <a:buChar char="•"/>
-            </a:pPr>
-            <a:r>
-              <a:rPr lang="en-US" sz="3000" dirty="0" smtClean="0">
-                <a:latin typeface="Soho Std" pitchFamily="18" charset="0"/>
-              </a:rPr>
-              <a:t>Simple</a:t>
-            </a:r>
           </a:p>
         </p:txBody>
       </p:sp>
@@ -10474,311 +7711,6 @@
                                         <p:cTn id="10" dur="500"/>
                                         <p:tgtEl>
                                           <p:spTgt spid="3"/>
-                                        </p:tgtEl>
-                                      </p:cBhvr>
-                                    </p:animEffect>
-                                  </p:childTnLst>
-                                </p:cTn>
-                              </p:par>
-                            </p:childTnLst>
-                          </p:cTn>
-                        </p:par>
-                      </p:childTnLst>
-                    </p:cTn>
-                  </p:par>
-                  <p:par>
-                    <p:cTn id="11" fill="hold">
-                      <p:stCondLst>
-                        <p:cond delay="indefinite"/>
-                      </p:stCondLst>
-                      <p:childTnLst>
-                        <p:par>
-                          <p:cTn id="12" fill="hold">
-                            <p:stCondLst>
-                              <p:cond delay="0"/>
-                            </p:stCondLst>
-                            <p:childTnLst>
-                              <p:par>
-                                <p:cTn id="13" presetID="10" presetClass="entr" presetSubtype="0" fill="hold" nodeType="clickEffect">
-                                  <p:stCondLst>
-                                    <p:cond delay="0"/>
-                                  </p:stCondLst>
-                                  <p:childTnLst>
-                                    <p:set>
-                                      <p:cBhvr>
-                                        <p:cTn id="14" dur="1" fill="hold">
-                                          <p:stCondLst>
-                                            <p:cond delay="0"/>
-                                          </p:stCondLst>
-                                        </p:cTn>
-                                        <p:tgtEl>
-                                          <p:spTgt spid="6">
-                                            <p:txEl>
-                                              <p:pRg st="0" end="0"/>
-                                            </p:txEl>
-                                          </p:spTgt>
-                                        </p:tgtEl>
-                                        <p:attrNameLst>
-                                          <p:attrName>style.visibility</p:attrName>
-                                        </p:attrNameLst>
-                                      </p:cBhvr>
-                                      <p:to>
-                                        <p:strVal val="visible"/>
-                                      </p:to>
-                                    </p:set>
-                                    <p:animEffect transition="in" filter="fade">
-                                      <p:cBhvr>
-                                        <p:cTn id="15" dur="500"/>
-                                        <p:tgtEl>
-                                          <p:spTgt spid="6">
-                                            <p:txEl>
-                                              <p:pRg st="0" end="0"/>
-                                            </p:txEl>
-                                          </p:spTgt>
-                                        </p:tgtEl>
-                                      </p:cBhvr>
-                                    </p:animEffect>
-                                  </p:childTnLst>
-                                </p:cTn>
-                              </p:par>
-                            </p:childTnLst>
-                          </p:cTn>
-                        </p:par>
-                      </p:childTnLst>
-                    </p:cTn>
-                  </p:par>
-                  <p:par>
-                    <p:cTn id="16" fill="hold">
-                      <p:stCondLst>
-                        <p:cond delay="indefinite"/>
-                      </p:stCondLst>
-                      <p:childTnLst>
-                        <p:par>
-                          <p:cTn id="17" fill="hold">
-                            <p:stCondLst>
-                              <p:cond delay="0"/>
-                            </p:stCondLst>
-                            <p:childTnLst>
-                              <p:par>
-                                <p:cTn id="18" presetID="10" presetClass="entr" presetSubtype="0" fill="hold" nodeType="clickEffect">
-                                  <p:stCondLst>
-                                    <p:cond delay="0"/>
-                                  </p:stCondLst>
-                                  <p:childTnLst>
-                                    <p:set>
-                                      <p:cBhvr>
-                                        <p:cTn id="19" dur="1" fill="hold">
-                                          <p:stCondLst>
-                                            <p:cond delay="0"/>
-                                          </p:stCondLst>
-                                        </p:cTn>
-                                        <p:tgtEl>
-                                          <p:spTgt spid="6">
-                                            <p:txEl>
-                                              <p:pRg st="1" end="1"/>
-                                            </p:txEl>
-                                          </p:spTgt>
-                                        </p:tgtEl>
-                                        <p:attrNameLst>
-                                          <p:attrName>style.visibility</p:attrName>
-                                        </p:attrNameLst>
-                                      </p:cBhvr>
-                                      <p:to>
-                                        <p:strVal val="visible"/>
-                                      </p:to>
-                                    </p:set>
-                                    <p:animEffect transition="in" filter="fade">
-                                      <p:cBhvr>
-                                        <p:cTn id="20" dur="500"/>
-                                        <p:tgtEl>
-                                          <p:spTgt spid="6">
-                                            <p:txEl>
-                                              <p:pRg st="1" end="1"/>
-                                            </p:txEl>
-                                          </p:spTgt>
-                                        </p:tgtEl>
-                                      </p:cBhvr>
-                                    </p:animEffect>
-                                  </p:childTnLst>
-                                </p:cTn>
-                              </p:par>
-                            </p:childTnLst>
-                          </p:cTn>
-                        </p:par>
-                      </p:childTnLst>
-                    </p:cTn>
-                  </p:par>
-                  <p:par>
-                    <p:cTn id="21" fill="hold">
-                      <p:stCondLst>
-                        <p:cond delay="indefinite"/>
-                      </p:stCondLst>
-                      <p:childTnLst>
-                        <p:par>
-                          <p:cTn id="22" fill="hold">
-                            <p:stCondLst>
-                              <p:cond delay="0"/>
-                            </p:stCondLst>
-                            <p:childTnLst>
-                              <p:par>
-                                <p:cTn id="23" presetID="10" presetClass="entr" presetSubtype="0" fill="hold" nodeType="clickEffect">
-                                  <p:stCondLst>
-                                    <p:cond delay="0"/>
-                                  </p:stCondLst>
-                                  <p:childTnLst>
-                                    <p:set>
-                                      <p:cBhvr>
-                                        <p:cTn id="24" dur="1" fill="hold">
-                                          <p:stCondLst>
-                                            <p:cond delay="0"/>
-                                          </p:stCondLst>
-                                        </p:cTn>
-                                        <p:tgtEl>
-                                          <p:spTgt spid="6">
-                                            <p:txEl>
-                                              <p:pRg st="2" end="2"/>
-                                            </p:txEl>
-                                          </p:spTgt>
-                                        </p:tgtEl>
-                                        <p:attrNameLst>
-                                          <p:attrName>style.visibility</p:attrName>
-                                        </p:attrNameLst>
-                                      </p:cBhvr>
-                                      <p:to>
-                                        <p:strVal val="visible"/>
-                                      </p:to>
-                                    </p:set>
-                                    <p:animEffect transition="in" filter="fade">
-                                      <p:cBhvr>
-                                        <p:cTn id="25" dur="500"/>
-                                        <p:tgtEl>
-                                          <p:spTgt spid="6">
-                                            <p:txEl>
-                                              <p:pRg st="2" end="2"/>
-                                            </p:txEl>
-                                          </p:spTgt>
-                                        </p:tgtEl>
-                                      </p:cBhvr>
-                                    </p:animEffect>
-                                  </p:childTnLst>
-                                </p:cTn>
-                              </p:par>
-                            </p:childTnLst>
-                          </p:cTn>
-                        </p:par>
-                      </p:childTnLst>
-                    </p:cTn>
-                  </p:par>
-                  <p:par>
-                    <p:cTn id="26" fill="hold">
-                      <p:stCondLst>
-                        <p:cond delay="indefinite"/>
-                      </p:stCondLst>
-                      <p:childTnLst>
-                        <p:par>
-                          <p:cTn id="27" fill="hold">
-                            <p:stCondLst>
-                              <p:cond delay="0"/>
-                            </p:stCondLst>
-                            <p:childTnLst>
-                              <p:par>
-                                <p:cTn id="28" presetID="10" presetClass="entr" presetSubtype="0" fill="hold" nodeType="clickEffect">
-                                  <p:stCondLst>
-                                    <p:cond delay="0"/>
-                                  </p:stCondLst>
-                                  <p:childTnLst>
-                                    <p:set>
-                                      <p:cBhvr>
-                                        <p:cTn id="29" dur="1" fill="hold">
-                                          <p:stCondLst>
-                                            <p:cond delay="0"/>
-                                          </p:stCondLst>
-                                        </p:cTn>
-                                        <p:tgtEl>
-                                          <p:spTgt spid="6">
-                                            <p:txEl>
-                                              <p:pRg st="3" end="3"/>
-                                            </p:txEl>
-                                          </p:spTgt>
-                                        </p:tgtEl>
-                                        <p:attrNameLst>
-                                          <p:attrName>style.visibility</p:attrName>
-                                        </p:attrNameLst>
-                                      </p:cBhvr>
-                                      <p:to>
-                                        <p:strVal val="visible"/>
-                                      </p:to>
-                                    </p:set>
-                                    <p:animEffect transition="in" filter="fade">
-                                      <p:cBhvr>
-                                        <p:cTn id="30" dur="500"/>
-                                        <p:tgtEl>
-                                          <p:spTgt spid="6">
-                                            <p:txEl>
-                                              <p:pRg st="3" end="3"/>
-                                            </p:txEl>
-                                          </p:spTgt>
-                                        </p:tgtEl>
-                                      </p:cBhvr>
-                                    </p:animEffect>
-                                  </p:childTnLst>
-                                </p:cTn>
-                              </p:par>
-                            </p:childTnLst>
-                          </p:cTn>
-                        </p:par>
-                      </p:childTnLst>
-                    </p:cTn>
-                  </p:par>
-                  <p:par>
-                    <p:cTn id="31" fill="hold">
-                      <p:stCondLst>
-                        <p:cond delay="indefinite"/>
-                      </p:stCondLst>
-                      <p:childTnLst>
-                        <p:par>
-                          <p:cTn id="32" fill="hold">
-                            <p:stCondLst>
-                              <p:cond delay="0"/>
-                            </p:stCondLst>
-                            <p:childTnLst>
-                              <p:par>
-                                <p:cTn id="33" presetID="10" presetClass="entr" presetSubtype="0" fill="hold" nodeType="clickEffect">
-                                  <p:stCondLst>
-                                    <p:cond delay="0"/>
-                                  </p:stCondLst>
-                                  <p:childTnLst>
-                                    <p:set>
-                                      <p:cBhvr>
-                                        <p:cTn id="34" dur="1" fill="hold">
-                                          <p:stCondLst>
-                                            <p:cond delay="0"/>
-                                          </p:stCondLst>
-                                        </p:cTn>
-                                        <p:tgtEl>
-                                          <p:spTgt spid="6">
-                                            <p:txEl>
-                                              <p:pRg st="4" end="4"/>
-                                            </p:txEl>
-                                          </p:spTgt>
-                                        </p:tgtEl>
-                                        <p:attrNameLst>
-                                          <p:attrName>style.visibility</p:attrName>
-                                        </p:attrNameLst>
-                                      </p:cBhvr>
-                                      <p:to>
-                                        <p:strVal val="visible"/>
-                                      </p:to>
-                                    </p:set>
-                                    <p:animEffect transition="in" filter="fade">
-                                      <p:cBhvr>
-                                        <p:cTn id="35" dur="500"/>
-                                        <p:tgtEl>
-                                          <p:spTgt spid="6">
-                                            <p:txEl>
-                                              <p:pRg st="4" end="4"/>
-                                            </p:txEl>
-                                          </p:spTgt>
                                         </p:tgtEl>
                                       </p:cBhvr>
                                     </p:animEffect>

</xml_diff>